<commit_message>
node server api validated
</commit_message>
<xml_diff>
--- a/docs/HospitalFabric (1).pptx
+++ b/docs/HospitalFabric (1).pptx
@@ -5,10 +5,10 @@
     <p:sldMasterId id="2147483648" r:id="rId1"/>
   </p:sldMasterIdLst>
   <p:sldIdLst>
-    <p:sldId id="256" r:id="rId3"/>
-    <p:sldId id="257" r:id="rId4"/>
-    <p:sldId id="258" r:id="rId5"/>
-    <p:sldId id="259" r:id="rId6"/>
+    <p:sldId id="256" r:id="rId2"/>
+    <p:sldId id="257" r:id="rId3"/>
+    <p:sldId id="258" r:id="rId4"/>
+    <p:sldId id="259" r:id="rId5"/>
   </p:sldIdLst>
   <p:sldSz cx="12192000" cy="6858000"/>
   <p:notesSz cx="6858000" cy="9144000"/>
@@ -107,6 +107,11 @@
       </a:defRPr>
     </a:lvl9pPr>
   </p:defaultTextStyle>
+  <p:extLst>
+    <p:ext uri="{EFAFB233-063F-42B5-8137-9DF3F51BA10A}">
+      <p15:sldGuideLst xmlns:p15="http://schemas.microsoft.com/office/powerpoint/2012/main"/>
+    </p:ext>
+  </p:extLst>
 </p:presentation>
 </file>
 
@@ -152,10 +157,9 @@
           </a:lstStyle>
           <a:p>
             <a:r>
-              <a:rPr lang="en-US" smtClean="0"/>
+              <a:rPr lang="en-US"/>
               <a:t>Click to edit Master title style</a:t>
             </a:r>
-            <a:endParaRPr lang="en-US"/>
           </a:p>
         </p:txBody>
       </p:sp>
@@ -217,10 +221,9 @@
           </a:lstStyle>
           <a:p>
             <a:r>
-              <a:rPr lang="en-US" smtClean="0"/>
+              <a:rPr lang="en-US"/>
               <a:t>Click to edit Master subtitle style</a:t>
             </a:r>
-            <a:endParaRPr lang="en-US"/>
           </a:p>
         </p:txBody>
       </p:sp>
@@ -241,6 +244,7 @@
           <a:p>
             <a:fld id="{63A1C593-65D0-4073-BCC9-577B9352EA97}" type="datetimeFigureOut">
               <a:rPr lang="en-US" smtClean="0"/>
+              <a:t>4/5/2023</a:t>
             </a:fld>
             <a:endParaRPr lang="en-US"/>
           </a:p>
@@ -282,6 +286,7 @@
           <a:p>
             <a:fld id="{9B618960-8005-486C-9A75-10CB2AAC16F9}" type="slidenum">
               <a:rPr lang="en-US" smtClean="0"/>
+              <a:t>‹#›</a:t>
             </a:fld>
             <a:endParaRPr lang="en-US"/>
           </a:p>
@@ -328,10 +333,9 @@
           <a:lstStyle/>
           <a:p>
             <a:r>
-              <a:rPr lang="en-US" smtClean="0"/>
+              <a:rPr lang="en-US"/>
               <a:t>Click to edit Master title style</a:t>
             </a:r>
-            <a:endParaRPr lang="en-US"/>
           </a:p>
         </p:txBody>
       </p:sp>
@@ -352,42 +356,37 @@
           <a:p>
             <a:pPr lvl="0"/>
             <a:r>
-              <a:rPr lang="en-US" smtClean="0"/>
+              <a:rPr lang="en-US"/>
               <a:t>Click to edit Master text styles</a:t>
             </a:r>
-            <a:endParaRPr lang="en-US" smtClean="0"/>
           </a:p>
           <a:p>
             <a:pPr lvl="1"/>
             <a:r>
-              <a:rPr lang="en-US" smtClean="0"/>
+              <a:rPr lang="en-US"/>
               <a:t>Second level</a:t>
             </a:r>
-            <a:endParaRPr lang="en-US" smtClean="0"/>
           </a:p>
           <a:p>
             <a:pPr lvl="2"/>
             <a:r>
-              <a:rPr lang="en-US" smtClean="0"/>
+              <a:rPr lang="en-US"/>
               <a:t>Third level</a:t>
             </a:r>
-            <a:endParaRPr lang="en-US" smtClean="0"/>
           </a:p>
           <a:p>
             <a:pPr lvl="3"/>
             <a:r>
-              <a:rPr lang="en-US" smtClean="0"/>
+              <a:rPr lang="en-US"/>
               <a:t>Fourth level</a:t>
             </a:r>
-            <a:endParaRPr lang="en-US" smtClean="0"/>
           </a:p>
           <a:p>
             <a:pPr lvl="4"/>
             <a:r>
-              <a:rPr lang="en-US" smtClean="0"/>
+              <a:rPr lang="en-US"/>
               <a:t>Fifth level</a:t>
             </a:r>
-            <a:endParaRPr lang="en-US"/>
           </a:p>
         </p:txBody>
       </p:sp>
@@ -408,6 +407,7 @@
           <a:p>
             <a:fld id="{63A1C593-65D0-4073-BCC9-577B9352EA97}" type="datetimeFigureOut">
               <a:rPr lang="en-US" smtClean="0"/>
+              <a:t>4/5/2023</a:t>
             </a:fld>
             <a:endParaRPr lang="en-US"/>
           </a:p>
@@ -449,6 +449,7 @@
           <a:p>
             <a:fld id="{9B618960-8005-486C-9A75-10CB2AAC16F9}" type="slidenum">
               <a:rPr lang="en-US" smtClean="0"/>
+              <a:t>‹#›</a:t>
             </a:fld>
             <a:endParaRPr lang="en-US"/>
           </a:p>
@@ -500,10 +501,9 @@
           <a:lstStyle/>
           <a:p>
             <a:r>
-              <a:rPr lang="en-US" smtClean="0"/>
+              <a:rPr lang="en-US"/>
               <a:t>Click to edit Master title style</a:t>
             </a:r>
-            <a:endParaRPr lang="en-US"/>
           </a:p>
         </p:txBody>
       </p:sp>
@@ -529,42 +529,37 @@
           <a:p>
             <a:pPr lvl="0"/>
             <a:r>
-              <a:rPr lang="en-US" smtClean="0"/>
+              <a:rPr lang="en-US"/>
               <a:t>Click to edit Master text styles</a:t>
             </a:r>
-            <a:endParaRPr lang="en-US" smtClean="0"/>
           </a:p>
           <a:p>
             <a:pPr lvl="1"/>
             <a:r>
-              <a:rPr lang="en-US" smtClean="0"/>
+              <a:rPr lang="en-US"/>
               <a:t>Second level</a:t>
             </a:r>
-            <a:endParaRPr lang="en-US" smtClean="0"/>
           </a:p>
           <a:p>
             <a:pPr lvl="2"/>
             <a:r>
-              <a:rPr lang="en-US" smtClean="0"/>
+              <a:rPr lang="en-US"/>
               <a:t>Third level</a:t>
             </a:r>
-            <a:endParaRPr lang="en-US" smtClean="0"/>
           </a:p>
           <a:p>
             <a:pPr lvl="3"/>
             <a:r>
-              <a:rPr lang="en-US" smtClean="0"/>
+              <a:rPr lang="en-US"/>
               <a:t>Fourth level</a:t>
             </a:r>
-            <a:endParaRPr lang="en-US" smtClean="0"/>
           </a:p>
           <a:p>
             <a:pPr lvl="4"/>
             <a:r>
-              <a:rPr lang="en-US" smtClean="0"/>
+              <a:rPr lang="en-US"/>
               <a:t>Fifth level</a:t>
             </a:r>
-            <a:endParaRPr lang="en-US"/>
           </a:p>
         </p:txBody>
       </p:sp>
@@ -585,6 +580,7 @@
           <a:p>
             <a:fld id="{63A1C593-65D0-4073-BCC9-577B9352EA97}" type="datetimeFigureOut">
               <a:rPr lang="en-US" smtClean="0"/>
+              <a:t>4/5/2023</a:t>
             </a:fld>
             <a:endParaRPr lang="en-US"/>
           </a:p>
@@ -626,6 +622,7 @@
           <a:p>
             <a:fld id="{9B618960-8005-486C-9A75-10CB2AAC16F9}" type="slidenum">
               <a:rPr lang="en-US" smtClean="0"/>
+              <a:t>‹#›</a:t>
             </a:fld>
             <a:endParaRPr lang="en-US"/>
           </a:p>
@@ -672,10 +669,9 @@
           <a:lstStyle/>
           <a:p>
             <a:r>
-              <a:rPr lang="en-US" smtClean="0"/>
+              <a:rPr lang="en-US"/>
               <a:t>Click to edit Master title style</a:t>
             </a:r>
-            <a:endParaRPr lang="en-US"/>
           </a:p>
         </p:txBody>
       </p:sp>
@@ -696,42 +692,37 @@
           <a:p>
             <a:pPr lvl="0"/>
             <a:r>
-              <a:rPr lang="en-US" smtClean="0"/>
+              <a:rPr lang="en-US"/>
               <a:t>Click to edit Master text styles</a:t>
             </a:r>
-            <a:endParaRPr lang="en-US" smtClean="0"/>
           </a:p>
           <a:p>
             <a:pPr lvl="1"/>
             <a:r>
-              <a:rPr lang="en-US" smtClean="0"/>
+              <a:rPr lang="en-US"/>
               <a:t>Second level</a:t>
             </a:r>
-            <a:endParaRPr lang="en-US" smtClean="0"/>
           </a:p>
           <a:p>
             <a:pPr lvl="2"/>
             <a:r>
-              <a:rPr lang="en-US" smtClean="0"/>
+              <a:rPr lang="en-US"/>
               <a:t>Third level</a:t>
             </a:r>
-            <a:endParaRPr lang="en-US" smtClean="0"/>
           </a:p>
           <a:p>
             <a:pPr lvl="3"/>
             <a:r>
-              <a:rPr lang="en-US" smtClean="0"/>
+              <a:rPr lang="en-US"/>
               <a:t>Fourth level</a:t>
             </a:r>
-            <a:endParaRPr lang="en-US" smtClean="0"/>
           </a:p>
           <a:p>
             <a:pPr lvl="4"/>
             <a:r>
-              <a:rPr lang="en-US" smtClean="0"/>
+              <a:rPr lang="en-US"/>
               <a:t>Fifth level</a:t>
             </a:r>
-            <a:endParaRPr lang="en-US"/>
           </a:p>
         </p:txBody>
       </p:sp>
@@ -752,6 +743,7 @@
           <a:p>
             <a:fld id="{63A1C593-65D0-4073-BCC9-577B9352EA97}" type="datetimeFigureOut">
               <a:rPr lang="en-US" smtClean="0"/>
+              <a:t>4/5/2023</a:t>
             </a:fld>
             <a:endParaRPr lang="en-US"/>
           </a:p>
@@ -793,6 +785,7 @@
           <a:p>
             <a:fld id="{9B618960-8005-486C-9A75-10CB2AAC16F9}" type="slidenum">
               <a:rPr lang="en-US" smtClean="0"/>
+              <a:t>‹#›</a:t>
             </a:fld>
             <a:endParaRPr lang="en-US"/>
           </a:p>
@@ -848,10 +841,9 @@
           </a:lstStyle>
           <a:p>
             <a:r>
-              <a:rPr lang="en-US" smtClean="0"/>
+              <a:rPr lang="en-US"/>
               <a:t>Click to edit Master title style</a:t>
             </a:r>
-            <a:endParaRPr lang="en-US"/>
           </a:p>
         </p:txBody>
       </p:sp>
@@ -968,10 +960,9 @@
           <a:p>
             <a:pPr lvl="0"/>
             <a:r>
-              <a:rPr lang="en-US" smtClean="0"/>
+              <a:rPr lang="en-US"/>
               <a:t>Click to edit Master text styles</a:t>
             </a:r>
-            <a:endParaRPr lang="en-US" smtClean="0"/>
           </a:p>
         </p:txBody>
       </p:sp>
@@ -992,6 +983,7 @@
           <a:p>
             <a:fld id="{63A1C593-65D0-4073-BCC9-577B9352EA97}" type="datetimeFigureOut">
               <a:rPr lang="en-US" smtClean="0"/>
+              <a:t>4/5/2023</a:t>
             </a:fld>
             <a:endParaRPr lang="en-US"/>
           </a:p>
@@ -1033,6 +1025,7 @@
           <a:p>
             <a:fld id="{9B618960-8005-486C-9A75-10CB2AAC16F9}" type="slidenum">
               <a:rPr lang="en-US" smtClean="0"/>
+              <a:t>‹#›</a:t>
             </a:fld>
             <a:endParaRPr lang="en-US"/>
           </a:p>
@@ -1079,10 +1072,9 @@
           <a:lstStyle/>
           <a:p>
             <a:r>
-              <a:rPr lang="en-US" smtClean="0"/>
+              <a:rPr lang="en-US"/>
               <a:t>Click to edit Master title style</a:t>
             </a:r>
-            <a:endParaRPr lang="en-US"/>
           </a:p>
         </p:txBody>
       </p:sp>
@@ -1108,42 +1100,37 @@
           <a:p>
             <a:pPr lvl="0"/>
             <a:r>
-              <a:rPr lang="en-US" smtClean="0"/>
+              <a:rPr lang="en-US"/>
               <a:t>Click to edit Master text styles</a:t>
             </a:r>
-            <a:endParaRPr lang="en-US" smtClean="0"/>
           </a:p>
           <a:p>
             <a:pPr lvl="1"/>
             <a:r>
-              <a:rPr lang="en-US" smtClean="0"/>
+              <a:rPr lang="en-US"/>
               <a:t>Second level</a:t>
             </a:r>
-            <a:endParaRPr lang="en-US" smtClean="0"/>
           </a:p>
           <a:p>
             <a:pPr lvl="2"/>
             <a:r>
-              <a:rPr lang="en-US" smtClean="0"/>
+              <a:rPr lang="en-US"/>
               <a:t>Third level</a:t>
             </a:r>
-            <a:endParaRPr lang="en-US" smtClean="0"/>
           </a:p>
           <a:p>
             <a:pPr lvl="3"/>
             <a:r>
-              <a:rPr lang="en-US" smtClean="0"/>
+              <a:rPr lang="en-US"/>
               <a:t>Fourth level</a:t>
             </a:r>
-            <a:endParaRPr lang="en-US" smtClean="0"/>
           </a:p>
           <a:p>
             <a:pPr lvl="4"/>
             <a:r>
-              <a:rPr lang="en-US" smtClean="0"/>
+              <a:rPr lang="en-US"/>
               <a:t>Fifth level</a:t>
             </a:r>
-            <a:endParaRPr lang="en-US"/>
           </a:p>
         </p:txBody>
       </p:sp>
@@ -1169,42 +1156,37 @@
           <a:p>
             <a:pPr lvl="0"/>
             <a:r>
-              <a:rPr lang="en-US" smtClean="0"/>
+              <a:rPr lang="en-US"/>
               <a:t>Click to edit Master text styles</a:t>
             </a:r>
-            <a:endParaRPr lang="en-US" smtClean="0"/>
           </a:p>
           <a:p>
             <a:pPr lvl="1"/>
             <a:r>
-              <a:rPr lang="en-US" smtClean="0"/>
+              <a:rPr lang="en-US"/>
               <a:t>Second level</a:t>
             </a:r>
-            <a:endParaRPr lang="en-US" smtClean="0"/>
           </a:p>
           <a:p>
             <a:pPr lvl="2"/>
             <a:r>
-              <a:rPr lang="en-US" smtClean="0"/>
+              <a:rPr lang="en-US"/>
               <a:t>Third level</a:t>
             </a:r>
-            <a:endParaRPr lang="en-US" smtClean="0"/>
           </a:p>
           <a:p>
             <a:pPr lvl="3"/>
             <a:r>
-              <a:rPr lang="en-US" smtClean="0"/>
+              <a:rPr lang="en-US"/>
               <a:t>Fourth level</a:t>
             </a:r>
-            <a:endParaRPr lang="en-US" smtClean="0"/>
           </a:p>
           <a:p>
             <a:pPr lvl="4"/>
             <a:r>
-              <a:rPr lang="en-US" smtClean="0"/>
+              <a:rPr lang="en-US"/>
               <a:t>Fifth level</a:t>
             </a:r>
-            <a:endParaRPr lang="en-US"/>
           </a:p>
         </p:txBody>
       </p:sp>
@@ -1225,6 +1207,7 @@
           <a:p>
             <a:fld id="{63A1C593-65D0-4073-BCC9-577B9352EA97}" type="datetimeFigureOut">
               <a:rPr lang="en-US" smtClean="0"/>
+              <a:t>4/5/2023</a:t>
             </a:fld>
             <a:endParaRPr lang="en-US"/>
           </a:p>
@@ -1266,6 +1249,7 @@
           <a:p>
             <a:fld id="{9B618960-8005-486C-9A75-10CB2AAC16F9}" type="slidenum">
               <a:rPr lang="en-US" smtClean="0"/>
+              <a:t>‹#›</a:t>
             </a:fld>
             <a:endParaRPr lang="en-US"/>
           </a:p>
@@ -1317,10 +1301,9 @@
           <a:lstStyle/>
           <a:p>
             <a:r>
-              <a:rPr lang="en-US" smtClean="0"/>
+              <a:rPr lang="en-US"/>
               <a:t>Click to edit Master title style</a:t>
             </a:r>
-            <a:endParaRPr lang="en-US"/>
           </a:p>
         </p:txBody>
       </p:sp>
@@ -1383,10 +1366,9 @@
           <a:p>
             <a:pPr lvl="0"/>
             <a:r>
-              <a:rPr lang="en-US" smtClean="0"/>
+              <a:rPr lang="en-US"/>
               <a:t>Click to edit Master text styles</a:t>
             </a:r>
-            <a:endParaRPr lang="en-US" smtClean="0"/>
           </a:p>
         </p:txBody>
       </p:sp>
@@ -1412,42 +1394,37 @@
           <a:p>
             <a:pPr lvl="0"/>
             <a:r>
-              <a:rPr lang="en-US" smtClean="0"/>
+              <a:rPr lang="en-US"/>
               <a:t>Click to edit Master text styles</a:t>
             </a:r>
-            <a:endParaRPr lang="en-US" smtClean="0"/>
           </a:p>
           <a:p>
             <a:pPr lvl="1"/>
             <a:r>
-              <a:rPr lang="en-US" smtClean="0"/>
+              <a:rPr lang="en-US"/>
               <a:t>Second level</a:t>
             </a:r>
-            <a:endParaRPr lang="en-US" smtClean="0"/>
           </a:p>
           <a:p>
             <a:pPr lvl="2"/>
             <a:r>
-              <a:rPr lang="en-US" smtClean="0"/>
+              <a:rPr lang="en-US"/>
               <a:t>Third level</a:t>
             </a:r>
-            <a:endParaRPr lang="en-US" smtClean="0"/>
           </a:p>
           <a:p>
             <a:pPr lvl="3"/>
             <a:r>
-              <a:rPr lang="en-US" smtClean="0"/>
+              <a:rPr lang="en-US"/>
               <a:t>Fourth level</a:t>
             </a:r>
-            <a:endParaRPr lang="en-US" smtClean="0"/>
           </a:p>
           <a:p>
             <a:pPr lvl="4"/>
             <a:r>
-              <a:rPr lang="en-US" smtClean="0"/>
+              <a:rPr lang="en-US"/>
               <a:t>Fifth level</a:t>
             </a:r>
-            <a:endParaRPr lang="en-US"/>
           </a:p>
         </p:txBody>
       </p:sp>
@@ -1510,10 +1487,9 @@
           <a:p>
             <a:pPr lvl="0"/>
             <a:r>
-              <a:rPr lang="en-US" smtClean="0"/>
+              <a:rPr lang="en-US"/>
               <a:t>Click to edit Master text styles</a:t>
             </a:r>
-            <a:endParaRPr lang="en-US" smtClean="0"/>
           </a:p>
         </p:txBody>
       </p:sp>
@@ -1539,42 +1515,37 @@
           <a:p>
             <a:pPr lvl="0"/>
             <a:r>
-              <a:rPr lang="en-US" smtClean="0"/>
+              <a:rPr lang="en-US"/>
               <a:t>Click to edit Master text styles</a:t>
             </a:r>
-            <a:endParaRPr lang="en-US" smtClean="0"/>
           </a:p>
           <a:p>
             <a:pPr lvl="1"/>
             <a:r>
-              <a:rPr lang="en-US" smtClean="0"/>
+              <a:rPr lang="en-US"/>
               <a:t>Second level</a:t>
             </a:r>
-            <a:endParaRPr lang="en-US" smtClean="0"/>
           </a:p>
           <a:p>
             <a:pPr lvl="2"/>
             <a:r>
-              <a:rPr lang="en-US" smtClean="0"/>
+              <a:rPr lang="en-US"/>
               <a:t>Third level</a:t>
             </a:r>
-            <a:endParaRPr lang="en-US" smtClean="0"/>
           </a:p>
           <a:p>
             <a:pPr lvl="3"/>
             <a:r>
-              <a:rPr lang="en-US" smtClean="0"/>
+              <a:rPr lang="en-US"/>
               <a:t>Fourth level</a:t>
             </a:r>
-            <a:endParaRPr lang="en-US" smtClean="0"/>
           </a:p>
           <a:p>
             <a:pPr lvl="4"/>
             <a:r>
-              <a:rPr lang="en-US" smtClean="0"/>
+              <a:rPr lang="en-US"/>
               <a:t>Fifth level</a:t>
             </a:r>
-            <a:endParaRPr lang="en-US"/>
           </a:p>
         </p:txBody>
       </p:sp>
@@ -1595,6 +1566,7 @@
           <a:p>
             <a:fld id="{63A1C593-65D0-4073-BCC9-577B9352EA97}" type="datetimeFigureOut">
               <a:rPr lang="en-US" smtClean="0"/>
+              <a:t>4/5/2023</a:t>
             </a:fld>
             <a:endParaRPr lang="en-US"/>
           </a:p>
@@ -1636,6 +1608,7 @@
           <a:p>
             <a:fld id="{9B618960-8005-486C-9A75-10CB2AAC16F9}" type="slidenum">
               <a:rPr lang="en-US" smtClean="0"/>
+              <a:t>‹#›</a:t>
             </a:fld>
             <a:endParaRPr lang="en-US"/>
           </a:p>
@@ -1682,10 +1655,9 @@
           <a:lstStyle/>
           <a:p>
             <a:r>
-              <a:rPr lang="en-US" smtClean="0"/>
+              <a:rPr lang="en-US"/>
               <a:t>Click to edit Master title style</a:t>
             </a:r>
-            <a:endParaRPr lang="en-US"/>
           </a:p>
         </p:txBody>
       </p:sp>
@@ -1706,6 +1678,7 @@
           <a:p>
             <a:fld id="{63A1C593-65D0-4073-BCC9-577B9352EA97}" type="datetimeFigureOut">
               <a:rPr lang="en-US" smtClean="0"/>
+              <a:t>4/5/2023</a:t>
             </a:fld>
             <a:endParaRPr lang="en-US"/>
           </a:p>
@@ -1747,6 +1720,7 @@
           <a:p>
             <a:fld id="{9B618960-8005-486C-9A75-10CB2AAC16F9}" type="slidenum">
               <a:rPr lang="en-US" smtClean="0"/>
+              <a:t>‹#›</a:t>
             </a:fld>
             <a:endParaRPr lang="en-US"/>
           </a:p>
@@ -1794,6 +1768,7 @@
           <a:p>
             <a:fld id="{63A1C593-65D0-4073-BCC9-577B9352EA97}" type="datetimeFigureOut">
               <a:rPr lang="en-US" smtClean="0"/>
+              <a:t>4/5/2023</a:t>
             </a:fld>
             <a:endParaRPr lang="en-US"/>
           </a:p>
@@ -1835,6 +1810,7 @@
           <a:p>
             <a:fld id="{9B618960-8005-486C-9A75-10CB2AAC16F9}" type="slidenum">
               <a:rPr lang="en-US" smtClean="0"/>
+              <a:t>‹#›</a:t>
             </a:fld>
             <a:endParaRPr lang="en-US"/>
           </a:p>
@@ -1890,10 +1866,9 @@
           </a:lstStyle>
           <a:p>
             <a:r>
-              <a:rPr lang="en-US" smtClean="0"/>
+              <a:rPr lang="en-US"/>
               <a:t>Click to edit Master title style</a:t>
             </a:r>
-            <a:endParaRPr lang="en-US"/>
           </a:p>
         </p:txBody>
       </p:sp>
@@ -1947,42 +1922,37 @@
           <a:p>
             <a:pPr lvl="0"/>
             <a:r>
-              <a:rPr lang="en-US" smtClean="0"/>
+              <a:rPr lang="en-US"/>
               <a:t>Click to edit Master text styles</a:t>
             </a:r>
-            <a:endParaRPr lang="en-US" smtClean="0"/>
           </a:p>
           <a:p>
             <a:pPr lvl="1"/>
             <a:r>
-              <a:rPr lang="en-US" smtClean="0"/>
+              <a:rPr lang="en-US"/>
               <a:t>Second level</a:t>
             </a:r>
-            <a:endParaRPr lang="en-US" smtClean="0"/>
           </a:p>
           <a:p>
             <a:pPr lvl="2"/>
             <a:r>
-              <a:rPr lang="en-US" smtClean="0"/>
+              <a:rPr lang="en-US"/>
               <a:t>Third level</a:t>
             </a:r>
-            <a:endParaRPr lang="en-US" smtClean="0"/>
           </a:p>
           <a:p>
             <a:pPr lvl="3"/>
             <a:r>
-              <a:rPr lang="en-US" smtClean="0"/>
+              <a:rPr lang="en-US"/>
               <a:t>Fourth level</a:t>
             </a:r>
-            <a:endParaRPr lang="en-US" smtClean="0"/>
           </a:p>
           <a:p>
             <a:pPr lvl="4"/>
             <a:r>
-              <a:rPr lang="en-US" smtClean="0"/>
+              <a:rPr lang="en-US"/>
               <a:t>Fifth level</a:t>
             </a:r>
-            <a:endParaRPr lang="en-US"/>
           </a:p>
         </p:txBody>
       </p:sp>
@@ -2045,10 +2015,9 @@
           <a:p>
             <a:pPr lvl="0"/>
             <a:r>
-              <a:rPr lang="en-US" smtClean="0"/>
+              <a:rPr lang="en-US"/>
               <a:t>Click to edit Master text styles</a:t>
             </a:r>
-            <a:endParaRPr lang="en-US" smtClean="0"/>
           </a:p>
         </p:txBody>
       </p:sp>
@@ -2069,6 +2038,7 @@
           <a:p>
             <a:fld id="{63A1C593-65D0-4073-BCC9-577B9352EA97}" type="datetimeFigureOut">
               <a:rPr lang="en-US" smtClean="0"/>
+              <a:t>4/5/2023</a:t>
             </a:fld>
             <a:endParaRPr lang="en-US"/>
           </a:p>
@@ -2110,6 +2080,7 @@
           <a:p>
             <a:fld id="{9B618960-8005-486C-9A75-10CB2AAC16F9}" type="slidenum">
               <a:rPr lang="en-US" smtClean="0"/>
+              <a:t>‹#›</a:t>
             </a:fld>
             <a:endParaRPr lang="en-US"/>
           </a:p>
@@ -2165,10 +2136,9 @@
           </a:lstStyle>
           <a:p>
             <a:r>
-              <a:rPr lang="en-US" smtClean="0"/>
+              <a:rPr lang="en-US"/>
               <a:t>Click to edit Master title style</a:t>
             </a:r>
-            <a:endParaRPr lang="en-US"/>
           </a:p>
         </p:txBody>
       </p:sp>
@@ -2292,10 +2262,9 @@
           <a:p>
             <a:pPr lvl="0"/>
             <a:r>
-              <a:rPr lang="en-US" smtClean="0"/>
+              <a:rPr lang="en-US"/>
               <a:t>Click to edit Master text styles</a:t>
             </a:r>
-            <a:endParaRPr lang="en-US" smtClean="0"/>
           </a:p>
         </p:txBody>
       </p:sp>
@@ -2316,6 +2285,7 @@
           <a:p>
             <a:fld id="{63A1C593-65D0-4073-BCC9-577B9352EA97}" type="datetimeFigureOut">
               <a:rPr lang="en-US" smtClean="0"/>
+              <a:t>4/5/2023</a:t>
             </a:fld>
             <a:endParaRPr lang="en-US"/>
           </a:p>
@@ -2357,6 +2327,7 @@
           <a:p>
             <a:fld id="{9B618960-8005-486C-9A75-10CB2AAC16F9}" type="slidenum">
               <a:rPr lang="en-US" smtClean="0"/>
+              <a:t>‹#›</a:t>
             </a:fld>
             <a:endParaRPr lang="en-US"/>
           </a:p>
@@ -2418,10 +2389,9 @@
           <a:lstStyle/>
           <a:p>
             <a:r>
-              <a:rPr lang="en-US" smtClean="0"/>
+              <a:rPr lang="en-US"/>
               <a:t>Click to edit Master title style</a:t>
             </a:r>
-            <a:endParaRPr lang="en-US"/>
           </a:p>
         </p:txBody>
       </p:sp>
@@ -2452,42 +2422,37 @@
           <a:p>
             <a:pPr lvl="0"/>
             <a:r>
-              <a:rPr lang="en-US" smtClean="0"/>
+              <a:rPr lang="en-US"/>
               <a:t>Click to edit Master text styles</a:t>
             </a:r>
-            <a:endParaRPr lang="en-US" smtClean="0"/>
           </a:p>
           <a:p>
             <a:pPr lvl="1"/>
             <a:r>
-              <a:rPr lang="en-US" smtClean="0"/>
+              <a:rPr lang="en-US"/>
               <a:t>Second level</a:t>
             </a:r>
-            <a:endParaRPr lang="en-US" smtClean="0"/>
           </a:p>
           <a:p>
             <a:pPr lvl="2"/>
             <a:r>
-              <a:rPr lang="en-US" smtClean="0"/>
+              <a:rPr lang="en-US"/>
               <a:t>Third level</a:t>
             </a:r>
-            <a:endParaRPr lang="en-US" smtClean="0"/>
           </a:p>
           <a:p>
             <a:pPr lvl="3"/>
             <a:r>
-              <a:rPr lang="en-US" smtClean="0"/>
+              <a:rPr lang="en-US"/>
               <a:t>Fourth level</a:t>
             </a:r>
-            <a:endParaRPr lang="en-US" smtClean="0"/>
           </a:p>
           <a:p>
             <a:pPr lvl="4"/>
             <a:r>
-              <a:rPr lang="en-US" smtClean="0"/>
+              <a:rPr lang="en-US"/>
               <a:t>Fifth level</a:t>
             </a:r>
-            <a:endParaRPr lang="en-US"/>
           </a:p>
         </p:txBody>
       </p:sp>
@@ -2526,6 +2491,7 @@
           <a:p>
             <a:fld id="{63A1C593-65D0-4073-BCC9-577B9352EA97}" type="datetimeFigureOut">
               <a:rPr lang="en-US" smtClean="0"/>
+              <a:t>4/5/2023</a:t>
             </a:fld>
             <a:endParaRPr lang="en-US"/>
           </a:p>
@@ -2603,6 +2569,7 @@
           <a:p>
             <a:fld id="{9B618960-8005-486C-9A75-10CB2AAC16F9}" type="slidenum">
               <a:rPr lang="en-US" smtClean="0"/>
+              <a:t>‹#›</a:t>
             </a:fld>
             <a:endParaRPr lang="en-US"/>
           </a:p>
@@ -2993,6 +2960,7 @@
         </p:style>
         <p:txBody>
           <a:bodyPr rtlCol="0" anchor="ctr"/>
+          <a:lstStyle/>
           <a:p>
             <a:pPr algn="ctr"/>
             <a:endParaRPr lang="en-US" sz="1350"/>
@@ -3035,6 +3003,7 @@
         </p:style>
         <p:txBody>
           <a:bodyPr rtlCol="0" anchor="ctr"/>
+          <a:lstStyle/>
           <a:p>
             <a:pPr algn="ctr"/>
             <a:endParaRPr lang="en-US" sz="1350"/>
@@ -3077,6 +3046,7 @@
         </p:style>
         <p:txBody>
           <a:bodyPr rtlCol="0" anchor="ctr"/>
+          <a:lstStyle/>
           <a:p>
             <a:pPr algn="ctr"/>
             <a:endParaRPr lang="en-US" sz="1350"/>
@@ -3103,6 +3073,7 @@
           <a:bodyPr wrap="square" rtlCol="0">
             <a:spAutoFit/>
           </a:bodyPr>
+          <a:lstStyle/>
           <a:p>
             <a:r>
               <a:rPr lang="en-US" sz="1350">
@@ -3111,10 +3082,6 @@
               </a:rPr>
               <a:t>Hospital 1 CA</a:t>
             </a:r>
-            <a:endParaRPr lang="en-US" sz="1350">
-              <a:latin typeface="Arial" panose="020B0604020202020204" pitchFamily="34" charset="0"/>
-              <a:cs typeface="Arial" panose="020B0604020202020204" pitchFamily="34" charset="0"/>
-            </a:endParaRPr>
           </a:p>
         </p:txBody>
       </p:sp>
@@ -3138,6 +3105,7 @@
           <a:bodyPr wrap="square" rtlCol="0">
             <a:spAutoFit/>
           </a:bodyPr>
+          <a:lstStyle/>
           <a:p>
             <a:r>
               <a:rPr lang="en-US" sz="1350">
@@ -3146,10 +3114,6 @@
               </a:rPr>
               <a:t>Hospital 2 CA</a:t>
             </a:r>
-            <a:endParaRPr lang="en-US" sz="1350">
-              <a:latin typeface="Arial" panose="020B0604020202020204" pitchFamily="34" charset="0"/>
-              <a:cs typeface="Arial" panose="020B0604020202020204" pitchFamily="34" charset="0"/>
-            </a:endParaRPr>
           </a:p>
         </p:txBody>
       </p:sp>
@@ -3189,6 +3153,7 @@
         </p:style>
         <p:txBody>
           <a:bodyPr rtlCol="0" anchor="ctr"/>
+          <a:lstStyle/>
           <a:p>
             <a:pPr algn="ctr"/>
             <a:endParaRPr lang="en-US" sz="1350"/>
@@ -3215,6 +3180,7 @@
           <a:bodyPr wrap="square" rtlCol="0">
             <a:spAutoFit/>
           </a:bodyPr>
+          <a:lstStyle/>
           <a:p>
             <a:r>
               <a:rPr lang="en-US" sz="1350">
@@ -3223,10 +3189,6 @@
               </a:rPr>
               <a:t>Orderer CA</a:t>
             </a:r>
-            <a:endParaRPr lang="en-US" sz="1350">
-              <a:latin typeface="Arial" panose="020B0604020202020204" pitchFamily="34" charset="0"/>
-              <a:cs typeface="Arial" panose="020B0604020202020204" pitchFamily="34" charset="0"/>
-            </a:endParaRPr>
           </a:p>
         </p:txBody>
       </p:sp>
@@ -3269,6 +3231,7 @@
         </p:style>
         <p:txBody>
           <a:bodyPr rtlCol="0" anchor="ctr"/>
+          <a:lstStyle/>
           <a:p>
             <a:pPr algn="ctr"/>
             <a:endParaRPr lang="en-US" sz="1350"/>
@@ -3311,6 +3274,7 @@
         </p:style>
         <p:txBody>
           <a:bodyPr rtlCol="0" anchor="ctr"/>
+          <a:lstStyle/>
           <a:p>
             <a:pPr algn="l"/>
             <a:r>
@@ -3373,6 +3337,7 @@
         </p:style>
         <p:txBody>
           <a:bodyPr rtlCol="0" anchor="ctr"/>
+          <a:lstStyle/>
           <a:p>
             <a:pPr algn="ctr"/>
             <a:r>
@@ -3385,13 +3350,6 @@
               </a:rPr>
               <a:t>Hospital Peer  1</a:t>
             </a:r>
-            <a:endParaRPr lang="en-US" sz="1400" b="1">
-              <a:solidFill>
-                <a:schemeClr val="tx1"/>
-              </a:solidFill>
-              <a:latin typeface="Arial" panose="020B0604020202020204" pitchFamily="34" charset="0"/>
-              <a:cs typeface="Arial" panose="020B0604020202020204" pitchFamily="34" charset="0"/>
-            </a:endParaRPr>
           </a:p>
         </p:txBody>
       </p:sp>
@@ -3431,6 +3389,7 @@
         </p:style>
         <p:txBody>
           <a:bodyPr rtlCol="0" anchor="ctr"/>
+          <a:lstStyle/>
           <a:p>
             <a:pPr algn="ctr"/>
             <a:r>
@@ -3444,14 +3403,6 @@
               </a:rPr>
               <a:t>Hospital Peer  2</a:t>
             </a:r>
-            <a:endParaRPr lang="en-US" sz="1400" b="1">
-              <a:solidFill>
-                <a:schemeClr val="tx1"/>
-              </a:solidFill>
-              <a:latin typeface="Arial" panose="020B0604020202020204" pitchFamily="34" charset="0"/>
-              <a:cs typeface="Arial" panose="020B0604020202020204" pitchFamily="34" charset="0"/>
-              <a:sym typeface="+mn-ea"/>
-            </a:endParaRPr>
           </a:p>
         </p:txBody>
       </p:sp>
@@ -3491,6 +3442,7 @@
         </p:style>
         <p:txBody>
           <a:bodyPr rtlCol="0" anchor="ctr"/>
+          <a:lstStyle/>
           <a:p>
             <a:pPr algn="ctr"/>
             <a:endParaRPr lang="en-US" sz="1350"/>
@@ -3533,6 +3485,7 @@
         </p:style>
         <p:txBody>
           <a:bodyPr rtlCol="0" anchor="ctr"/>
+          <a:lstStyle/>
           <a:p>
             <a:pPr algn="ctr"/>
             <a:endParaRPr lang="en-US" sz="1350"/>
@@ -3575,6 +3528,7 @@
         </p:style>
         <p:txBody>
           <a:bodyPr rtlCol="0" anchor="ctr"/>
+          <a:lstStyle/>
           <a:p>
             <a:pPr algn="ctr"/>
             <a:endParaRPr lang="en-US" sz="1350"/>
@@ -3707,6 +3661,7 @@
           <a:bodyPr wrap="square" rtlCol="0">
             <a:spAutoFit/>
           </a:bodyPr>
+          <a:lstStyle/>
           <a:p>
             <a:r>
               <a:rPr lang="en-US" sz="1400">
@@ -3729,10 +3684,6 @@
               </a:rPr>
               <a:t>l file in Docker</a:t>
             </a:r>
-            <a:endParaRPr lang="en-US" sz="1400">
-              <a:latin typeface="Arial" panose="020B0604020202020204" pitchFamily="34" charset="0"/>
-              <a:cs typeface="Arial" panose="020B0604020202020204" pitchFamily="34" charset="0"/>
-            </a:endParaRPr>
           </a:p>
         </p:txBody>
       </p:sp>
@@ -3844,6 +3795,7 @@
           <a:bodyPr wrap="square" rtlCol="0">
             <a:spAutoFit/>
           </a:bodyPr>
+          <a:lstStyle/>
           <a:p>
             <a:pPr marL="285750" indent="-285750" algn="just">
               <a:buFont typeface="Arial" panose="020B0604020202020204" pitchFamily="34" charset="0"/>
@@ -3922,10 +3874,6 @@
               </a:rPr>
               <a:t>)</a:t>
             </a:r>
-            <a:endParaRPr lang="en-US" sz="1400">
-              <a:latin typeface="Arial" panose="020B0604020202020204" pitchFamily="34" charset="0"/>
-              <a:cs typeface="Arial" panose="020B0604020202020204" pitchFamily="34" charset="0"/>
-            </a:endParaRPr>
           </a:p>
         </p:txBody>
       </p:sp>
@@ -3977,6 +3925,7 @@
         </p:style>
         <p:txBody>
           <a:bodyPr rtlCol="0" anchor="ctr"/>
+          <a:lstStyle/>
           <a:p>
             <a:pPr algn="ctr"/>
             <a:endParaRPr lang="en-US"/>
@@ -4003,6 +3952,7 @@
           <a:bodyPr wrap="none" rtlCol="0">
             <a:spAutoFit/>
           </a:bodyPr>
+          <a:lstStyle/>
           <a:p>
             <a:pPr algn="l"/>
             <a:r>
@@ -4012,10 +3962,6 @@
               </a:rPr>
               <a:t>Hospital Network</a:t>
             </a:r>
-            <a:endParaRPr lang="en-US" sz="1400" b="1">
-              <a:latin typeface="Arial" panose="020B0604020202020204" pitchFamily="34" charset="0"/>
-              <a:cs typeface="Arial" panose="020B0604020202020204" pitchFamily="34" charset="0"/>
-            </a:endParaRPr>
           </a:p>
         </p:txBody>
       </p:sp>
@@ -4193,6 +4139,7 @@
           <a:bodyPr wrap="none" rtlCol="0">
             <a:spAutoFit/>
           </a:bodyPr>
+          <a:lstStyle/>
           <a:p>
             <a:r>
               <a:rPr lang="en-US" sz="1400" b="1">
@@ -4204,13 +4151,6 @@
               </a:rPr>
               <a:t>Hospital-Channel</a:t>
             </a:r>
-            <a:endParaRPr lang="en-US" sz="1400" b="1">
-              <a:solidFill>
-                <a:schemeClr val="tx1"/>
-              </a:solidFill>
-              <a:latin typeface="Arial" panose="020B0604020202020204" pitchFamily="34" charset="0"/>
-              <a:cs typeface="Arial" panose="020B0604020202020204" pitchFamily="34" charset="0"/>
-            </a:endParaRPr>
           </a:p>
           <a:p>
             <a:r>
@@ -4223,13 +4163,6 @@
               </a:rPr>
               <a:t>(Create a sample </a:t>
             </a:r>
-            <a:endParaRPr lang="en-US" sz="1400">
-              <a:solidFill>
-                <a:schemeClr val="tx1"/>
-              </a:solidFill>
-              <a:latin typeface="Arial" panose="020B0604020202020204" pitchFamily="34" charset="0"/>
-              <a:cs typeface="Arial" panose="020B0604020202020204" pitchFamily="34" charset="0"/>
-            </a:endParaRPr>
           </a:p>
           <a:p>
             <a:r>
@@ -4242,13 +4175,6 @@
               </a:rPr>
               <a:t>transaction for testing</a:t>
             </a:r>
-            <a:endParaRPr lang="en-US" sz="1400">
-              <a:solidFill>
-                <a:schemeClr val="tx1"/>
-              </a:solidFill>
-              <a:latin typeface="Arial" panose="020B0604020202020204" pitchFamily="34" charset="0"/>
-              <a:cs typeface="Arial" panose="020B0604020202020204" pitchFamily="34" charset="0"/>
-            </a:endParaRPr>
           </a:p>
           <a:p>
             <a:r>
@@ -4261,13 +4187,6 @@
               </a:rPr>
               <a:t>the query)</a:t>
             </a:r>
-            <a:endParaRPr lang="en-US" sz="1400">
-              <a:solidFill>
-                <a:schemeClr val="tx1"/>
-              </a:solidFill>
-              <a:latin typeface="Arial" panose="020B0604020202020204" pitchFamily="34" charset="0"/>
-              <a:cs typeface="Arial" panose="020B0604020202020204" pitchFamily="34" charset="0"/>
-            </a:endParaRPr>
           </a:p>
         </p:txBody>
       </p:sp>
@@ -4291,6 +4210,7 @@
           <a:bodyPr wrap="square" rtlCol="0">
             <a:spAutoFit/>
           </a:bodyPr>
+          <a:lstStyle/>
           <a:p>
             <a:pPr algn="l"/>
             <a:r>
@@ -4334,6 +4254,7 @@
           <a:bodyPr wrap="square" rtlCol="0">
             <a:spAutoFit/>
           </a:bodyPr>
+          <a:lstStyle/>
           <a:p>
             <a:pPr algn="ctr"/>
             <a:r>
@@ -4347,7 +4268,6 @@
               <a:rPr lang="en-US"/>
               <a:t> </a:t>
             </a:r>
-            <a:endParaRPr lang="en-US"/>
           </a:p>
         </p:txBody>
       </p:sp>
@@ -4399,6 +4319,7 @@
         </p:style>
         <p:txBody>
           <a:bodyPr rtlCol="0" anchor="ctr"/>
+          <a:lstStyle/>
           <a:p>
             <a:pPr algn="ctr"/>
             <a:endParaRPr lang="en-US"/>
@@ -4441,6 +4362,7 @@
         </p:style>
         <p:txBody>
           <a:bodyPr rtlCol="0" anchor="ctr"/>
+          <a:lstStyle/>
           <a:p>
             <a:pPr algn="ctr"/>
             <a:r>
@@ -4453,13 +4375,6 @@
               </a:rPr>
               <a:t>Hospital Peer  1</a:t>
             </a:r>
-            <a:endParaRPr lang="en-US" sz="1400" b="1">
-              <a:solidFill>
-                <a:schemeClr val="tx1"/>
-              </a:solidFill>
-              <a:latin typeface="Arial" panose="020B0604020202020204" pitchFamily="34" charset="0"/>
-              <a:cs typeface="Arial" panose="020B0604020202020204" pitchFamily="34" charset="0"/>
-            </a:endParaRPr>
           </a:p>
         </p:txBody>
       </p:sp>
@@ -4496,6 +4411,7 @@
           <a:bodyPr wrap="none" rtlCol="0">
             <a:spAutoFit/>
           </a:bodyPr>
+          <a:lstStyle/>
           <a:p>
             <a:r>
               <a:rPr lang="en-US" sz="1400" b="1">
@@ -4504,10 +4420,6 @@
               </a:rPr>
               <a:t>Level DB</a:t>
             </a:r>
-            <a:endParaRPr lang="en-US" sz="1400" b="1">
-              <a:latin typeface="Arial" panose="020B0604020202020204" pitchFamily="34" charset="0"/>
-              <a:cs typeface="Arial" panose="020B0604020202020204" pitchFamily="34" charset="0"/>
-            </a:endParaRPr>
           </a:p>
         </p:txBody>
       </p:sp>
@@ -4544,6 +4456,7 @@
           <a:bodyPr wrap="square" rtlCol="0">
             <a:spAutoFit/>
           </a:bodyPr>
+          <a:lstStyle/>
           <a:p>
             <a:r>
               <a:rPr lang="en-US" sz="1400" b="1">
@@ -4552,10 +4465,6 @@
               </a:rPr>
               <a:t>Ledger</a:t>
             </a:r>
-            <a:endParaRPr lang="en-US" sz="1400" b="1">
-              <a:latin typeface="Arial" panose="020B0604020202020204" pitchFamily="34" charset="0"/>
-              <a:cs typeface="Arial" panose="020B0604020202020204" pitchFamily="34" charset="0"/>
-            </a:endParaRPr>
           </a:p>
         </p:txBody>
       </p:sp>
@@ -4656,6 +4565,7 @@
           <a:bodyPr wrap="none" rtlCol="0">
             <a:spAutoFit/>
           </a:bodyPr>
+          <a:lstStyle/>
           <a:p>
             <a:r>
               <a:rPr lang="en-US" sz="1400">
@@ -4664,10 +4574,6 @@
               </a:rPr>
               <a:t>Transaction </a:t>
             </a:r>
-            <a:endParaRPr lang="en-US" sz="1400">
-              <a:latin typeface="Arial" panose="020B0604020202020204" pitchFamily="34" charset="0"/>
-              <a:cs typeface="Arial" panose="020B0604020202020204" pitchFamily="34" charset="0"/>
-            </a:endParaRPr>
           </a:p>
           <a:p>
             <a:r>
@@ -4677,10 +4583,6 @@
               </a:rPr>
               <a:t>History</a:t>
             </a:r>
-            <a:endParaRPr lang="en-US" sz="1400">
-              <a:latin typeface="Arial" panose="020B0604020202020204" pitchFamily="34" charset="0"/>
-              <a:cs typeface="Arial" panose="020B0604020202020204" pitchFamily="34" charset="0"/>
-            </a:endParaRPr>
           </a:p>
         </p:txBody>
       </p:sp>
@@ -4704,6 +4606,7 @@
           <a:bodyPr wrap="none" rtlCol="0">
             <a:spAutoFit/>
           </a:bodyPr>
+          <a:lstStyle/>
           <a:p>
             <a:r>
               <a:rPr lang="en-US" sz="1400">
@@ -4712,10 +4615,6 @@
               </a:rPr>
               <a:t>Latest</a:t>
             </a:r>
-            <a:endParaRPr lang="en-US" sz="1400">
-              <a:latin typeface="Arial" panose="020B0604020202020204" pitchFamily="34" charset="0"/>
-              <a:cs typeface="Arial" panose="020B0604020202020204" pitchFamily="34" charset="0"/>
-            </a:endParaRPr>
           </a:p>
           <a:p>
             <a:r>
@@ -4725,10 +4624,6 @@
               </a:rPr>
               <a:t>Transactions </a:t>
             </a:r>
-            <a:endParaRPr lang="en-US" sz="1400">
-              <a:latin typeface="Arial" panose="020B0604020202020204" pitchFamily="34" charset="0"/>
-              <a:cs typeface="Arial" panose="020B0604020202020204" pitchFamily="34" charset="0"/>
-            </a:endParaRPr>
           </a:p>
         </p:txBody>
       </p:sp>
@@ -4780,6 +4675,7 @@
         </p:style>
         <p:txBody>
           <a:bodyPr rtlCol="0" anchor="ctr"/>
+          <a:lstStyle/>
           <a:p>
             <a:pPr algn="ctr"/>
             <a:endParaRPr lang="en-US"/>
@@ -4822,6 +4718,7 @@
         </p:style>
         <p:txBody>
           <a:bodyPr rtlCol="0" anchor="ctr"/>
+          <a:lstStyle/>
           <a:p>
             <a:pPr algn="ctr"/>
             <a:r>
@@ -4834,13 +4731,6 @@
               </a:rPr>
               <a:t>Hospital Peer  2</a:t>
             </a:r>
-            <a:endParaRPr lang="en-US" sz="1400" b="1">
-              <a:solidFill>
-                <a:schemeClr val="tx1"/>
-              </a:solidFill>
-              <a:latin typeface="Arial" panose="020B0604020202020204" pitchFamily="34" charset="0"/>
-              <a:cs typeface="Arial" panose="020B0604020202020204" pitchFamily="34" charset="0"/>
-            </a:endParaRPr>
           </a:p>
         </p:txBody>
       </p:sp>
@@ -4877,6 +4767,7 @@
           <a:bodyPr wrap="none" rtlCol="0">
             <a:spAutoFit/>
           </a:bodyPr>
+          <a:lstStyle/>
           <a:p>
             <a:r>
               <a:rPr lang="en-US" sz="1400" b="1">
@@ -4885,10 +4776,6 @@
               </a:rPr>
               <a:t>Level DB</a:t>
             </a:r>
-            <a:endParaRPr lang="en-US" sz="1400" b="1">
-              <a:latin typeface="Arial" panose="020B0604020202020204" pitchFamily="34" charset="0"/>
-              <a:cs typeface="Arial" panose="020B0604020202020204" pitchFamily="34" charset="0"/>
-            </a:endParaRPr>
           </a:p>
         </p:txBody>
       </p:sp>
@@ -4925,6 +4812,7 @@
           <a:bodyPr wrap="square" rtlCol="0">
             <a:spAutoFit/>
           </a:bodyPr>
+          <a:lstStyle/>
           <a:p>
             <a:r>
               <a:rPr lang="en-US" sz="1400" b="1">
@@ -4933,10 +4821,6 @@
               </a:rPr>
               <a:t>Ledger</a:t>
             </a:r>
-            <a:endParaRPr lang="en-US" sz="1400" b="1">
-              <a:latin typeface="Arial" panose="020B0604020202020204" pitchFamily="34" charset="0"/>
-              <a:cs typeface="Arial" panose="020B0604020202020204" pitchFamily="34" charset="0"/>
-            </a:endParaRPr>
           </a:p>
         </p:txBody>
       </p:sp>
@@ -5037,6 +4921,7 @@
           <a:bodyPr wrap="none" rtlCol="0">
             <a:spAutoFit/>
           </a:bodyPr>
+          <a:lstStyle/>
           <a:p>
             <a:r>
               <a:rPr lang="en-US" sz="1400">
@@ -5045,10 +4930,6 @@
               </a:rPr>
               <a:t>Transaction </a:t>
             </a:r>
-            <a:endParaRPr lang="en-US" sz="1400">
-              <a:latin typeface="Arial" panose="020B0604020202020204" pitchFamily="34" charset="0"/>
-              <a:cs typeface="Arial" panose="020B0604020202020204" pitchFamily="34" charset="0"/>
-            </a:endParaRPr>
           </a:p>
           <a:p>
             <a:r>
@@ -5058,10 +4939,6 @@
               </a:rPr>
               <a:t>History</a:t>
             </a:r>
-            <a:endParaRPr lang="en-US" sz="1400">
-              <a:latin typeface="Arial" panose="020B0604020202020204" pitchFamily="34" charset="0"/>
-              <a:cs typeface="Arial" panose="020B0604020202020204" pitchFamily="34" charset="0"/>
-            </a:endParaRPr>
           </a:p>
         </p:txBody>
       </p:sp>
@@ -5085,6 +4962,7 @@
           <a:bodyPr wrap="none" rtlCol="0">
             <a:spAutoFit/>
           </a:bodyPr>
+          <a:lstStyle/>
           <a:p>
             <a:r>
               <a:rPr lang="en-US" sz="1400">
@@ -5093,10 +4971,6 @@
               </a:rPr>
               <a:t>Latest</a:t>
             </a:r>
-            <a:endParaRPr lang="en-US" sz="1400">
-              <a:latin typeface="Arial" panose="020B0604020202020204" pitchFamily="34" charset="0"/>
-              <a:cs typeface="Arial" panose="020B0604020202020204" pitchFamily="34" charset="0"/>
-            </a:endParaRPr>
           </a:p>
           <a:p>
             <a:r>
@@ -5106,10 +4980,6 @@
               </a:rPr>
               <a:t>Transactions </a:t>
             </a:r>
-            <a:endParaRPr lang="en-US" sz="1400">
-              <a:latin typeface="Arial" panose="020B0604020202020204" pitchFamily="34" charset="0"/>
-              <a:cs typeface="Arial" panose="020B0604020202020204" pitchFamily="34" charset="0"/>
-            </a:endParaRPr>
           </a:p>
         </p:txBody>
       </p:sp>
@@ -5133,6 +5003,7 @@
           <a:bodyPr wrap="none" rtlCol="0">
             <a:spAutoFit/>
           </a:bodyPr>
+          <a:lstStyle/>
           <a:p>
             <a:r>
               <a:rPr lang="en-US" sz="1400">
@@ -5141,10 +5012,6 @@
               </a:rPr>
               <a:t>Create a channel </a:t>
             </a:r>
-            <a:endParaRPr lang="en-US" sz="1400">
-              <a:latin typeface="Arial" panose="020B0604020202020204" pitchFamily="34" charset="0"/>
-              <a:cs typeface="Arial" panose="020B0604020202020204" pitchFamily="34" charset="0"/>
-            </a:endParaRPr>
           </a:p>
           <a:p>
             <a:r>
@@ -5161,10 +5028,6 @@
               </a:rPr>
               <a:t>peer binary</a:t>
             </a:r>
-            <a:endParaRPr lang="en-US" sz="1400" b="1">
-              <a:latin typeface="Arial" panose="020B0604020202020204" pitchFamily="34" charset="0"/>
-              <a:cs typeface="Arial" panose="020B0604020202020204" pitchFamily="34" charset="0"/>
-            </a:endParaRPr>
           </a:p>
         </p:txBody>
       </p:sp>
@@ -5177,7 +5040,7 @@
           <p:nvPr/>
         </p:nvPicPr>
         <p:blipFill>
-          <a:blip r:embed="rId1"/>
+          <a:blip r:embed="rId2"/>
           <a:stretch>
             <a:fillRect/>
           </a:stretch>
@@ -5201,7 +5064,7 @@
           <p:nvPr/>
         </p:nvPicPr>
         <p:blipFill>
-          <a:blip r:embed="rId1"/>
+          <a:blip r:embed="rId2"/>
           <a:stretch>
             <a:fillRect/>
           </a:stretch>
@@ -5225,7 +5088,7 @@
           <p:nvPr/>
         </p:nvPicPr>
         <p:blipFill>
-          <a:blip r:embed="rId2"/>
+          <a:blip r:embed="rId3"/>
           <a:stretch>
             <a:fillRect/>
           </a:stretch>
@@ -5249,7 +5112,7 @@
           <p:nvPr/>
         </p:nvPicPr>
         <p:blipFill>
-          <a:blip r:embed="rId2"/>
+          <a:blip r:embed="rId3"/>
           <a:stretch>
             <a:fillRect/>
           </a:stretch>
@@ -5273,7 +5136,7 @@
           <p:nvPr/>
         </p:nvPicPr>
         <p:blipFill>
-          <a:blip r:embed="rId3"/>
+          <a:blip r:embed="rId4"/>
           <a:stretch>
             <a:fillRect/>
           </a:stretch>
@@ -5297,7 +5160,7 @@
           <p:nvPr/>
         </p:nvPicPr>
         <p:blipFill>
-          <a:blip r:embed="rId3"/>
+          <a:blip r:embed="rId4"/>
           <a:stretch>
             <a:fillRect/>
           </a:stretch>
@@ -5329,7 +5192,14 @@
         <p:cNvGrpSpPr/>
         <p:nvPr/>
       </p:nvGrpSpPr>
-      <p:grpSpPr/>
+      <p:grpSpPr>
+        <a:xfrm>
+          <a:off x="0" y="0"/>
+          <a:ext cx="0" cy="0"/>
+          <a:chOff x="0" y="0"/>
+          <a:chExt cx="0" cy="0"/>
+        </a:xfrm>
+      </p:grpSpPr>
       <p:sp>
         <p:nvSpPr>
           <p:cNvPr id="2" name="Rectangles 1"/>
@@ -5361,6 +5231,7 @@
         </p:style>
         <p:txBody>
           <a:bodyPr rtlCol="0" anchor="ctr"/>
+          <a:lstStyle/>
           <a:p>
             <a:pPr algn="ctr"/>
             <a:r>
@@ -5373,13 +5244,6 @@
               </a:rPr>
               <a:t>APP</a:t>
             </a:r>
-            <a:endParaRPr lang="en-US" sz="1400" b="1">
-              <a:solidFill>
-                <a:schemeClr val="tx1"/>
-              </a:solidFill>
-              <a:latin typeface="Arial" panose="020B0604020202020204" pitchFamily="34" charset="0"/>
-              <a:cs typeface="Arial" panose="020B0604020202020204" pitchFamily="34" charset="0"/>
-            </a:endParaRPr>
           </a:p>
         </p:txBody>
       </p:sp>
@@ -5387,14 +5251,14 @@
         <p:nvPicPr>
           <p:cNvPr id="8" name="Content Placeholder 7"/>
           <p:cNvPicPr>
-            <a:picLocks noChangeAspect="1"/>
+            <a:picLocks noGrp="1" noChangeAspect="1"/>
           </p:cNvPicPr>
           <p:nvPr>
             <p:ph idx="1"/>
           </p:nvPr>
         </p:nvPicPr>
         <p:blipFill>
-          <a:blip r:embed="rId1"/>
+          <a:blip r:embed="rId2"/>
           <a:stretch>
             <a:fillRect/>
           </a:stretch>
@@ -5429,6 +5293,7 @@
           <a:bodyPr wrap="none" rtlCol="0">
             <a:spAutoFit/>
           </a:bodyPr>
+          <a:lstStyle/>
           <a:p>
             <a:r>
               <a:rPr lang="en-US" sz="1400" b="1">
@@ -5437,10 +5302,6 @@
               </a:rPr>
               <a:t>Patient/</a:t>
             </a:r>
-            <a:endParaRPr lang="en-US" sz="1400" b="1">
-              <a:latin typeface="Arial" panose="020B0604020202020204" pitchFamily="34" charset="0"/>
-              <a:cs typeface="Arial" panose="020B0604020202020204" pitchFamily="34" charset="0"/>
-            </a:endParaRPr>
           </a:p>
           <a:p>
             <a:r>
@@ -5450,10 +5311,6 @@
               </a:rPr>
               <a:t>Doctor</a:t>
             </a:r>
-            <a:endParaRPr lang="en-US" sz="1400" b="1">
-              <a:latin typeface="Arial" panose="020B0604020202020204" pitchFamily="34" charset="0"/>
-              <a:cs typeface="Arial" panose="020B0604020202020204" pitchFamily="34" charset="0"/>
-            </a:endParaRPr>
           </a:p>
         </p:txBody>
       </p:sp>
@@ -5488,6 +5345,7 @@
         </p:style>
         <p:txBody>
           <a:bodyPr rtlCol="0" anchor="ctr"/>
+          <a:lstStyle/>
           <a:p>
             <a:pPr algn="ctr"/>
             <a:r>
@@ -5500,13 +5358,6 @@
               </a:rPr>
               <a:t>SDK</a:t>
             </a:r>
-            <a:endParaRPr lang="en-US" sz="1400" b="1">
-              <a:solidFill>
-                <a:schemeClr val="tx1"/>
-              </a:solidFill>
-              <a:latin typeface="Arial" panose="020B0604020202020204" pitchFamily="34" charset="0"/>
-              <a:cs typeface="Arial" panose="020B0604020202020204" pitchFamily="34" charset="0"/>
-            </a:endParaRPr>
           </a:p>
         </p:txBody>
       </p:sp>
@@ -5583,6 +5434,7 @@
         </p:style>
         <p:txBody>
           <a:bodyPr rtlCol="0" anchor="ctr"/>
+          <a:lstStyle/>
           <a:p>
             <a:pPr algn="ctr"/>
             <a:r>
@@ -5595,13 +5447,6 @@
               </a:rPr>
               <a:t>Endorser Peer 1</a:t>
             </a:r>
-            <a:endParaRPr lang="en-US" sz="1400" b="1">
-              <a:solidFill>
-                <a:schemeClr val="tx1"/>
-              </a:solidFill>
-              <a:latin typeface="Arial" panose="020B0604020202020204" pitchFamily="34" charset="0"/>
-              <a:cs typeface="Arial" panose="020B0604020202020204" pitchFamily="34" charset="0"/>
-            </a:endParaRPr>
           </a:p>
         </p:txBody>
       </p:sp>
@@ -5639,6 +5484,7 @@
         </p:style>
         <p:txBody>
           <a:bodyPr rtlCol="0" anchor="ctr"/>
+          <a:lstStyle/>
           <a:p>
             <a:pPr algn="ctr"/>
             <a:r>
@@ -5651,13 +5497,6 @@
               </a:rPr>
               <a:t>Chain Code </a:t>
             </a:r>
-            <a:endParaRPr lang="en-US" sz="1400" b="1">
-              <a:solidFill>
-                <a:schemeClr val="tx1"/>
-              </a:solidFill>
-              <a:latin typeface="Arial" panose="020B0604020202020204" pitchFamily="34" charset="0"/>
-              <a:cs typeface="Arial" panose="020B0604020202020204" pitchFamily="34" charset="0"/>
-            </a:endParaRPr>
           </a:p>
         </p:txBody>
       </p:sp>
@@ -5695,6 +5534,7 @@
         </p:style>
         <p:txBody>
           <a:bodyPr rtlCol="0" anchor="ctr"/>
+          <a:lstStyle/>
           <a:p>
             <a:pPr algn="ctr"/>
             <a:r>
@@ -5707,13 +5547,6 @@
               </a:rPr>
               <a:t>Orderer</a:t>
             </a:r>
-            <a:endParaRPr lang="en-US" sz="1400" b="1">
-              <a:solidFill>
-                <a:schemeClr val="tx1"/>
-              </a:solidFill>
-              <a:latin typeface="Arial" panose="020B0604020202020204" pitchFamily="34" charset="0"/>
-              <a:cs typeface="Arial" panose="020B0604020202020204" pitchFamily="34" charset="0"/>
-            </a:endParaRPr>
           </a:p>
         </p:txBody>
       </p:sp>
@@ -5748,6 +5581,7 @@
         </p:style>
         <p:txBody>
           <a:bodyPr rtlCol="0" anchor="ctr"/>
+          <a:lstStyle/>
           <a:p>
             <a:pPr algn="ctr"/>
             <a:r>
@@ -5760,13 +5594,6 @@
               </a:rPr>
               <a:t>Fabric CA</a:t>
             </a:r>
-            <a:endParaRPr lang="en-US" sz="1400" b="1">
-              <a:solidFill>
-                <a:schemeClr val="tx1"/>
-              </a:solidFill>
-              <a:latin typeface="Arial" panose="020B0604020202020204" pitchFamily="34" charset="0"/>
-              <a:cs typeface="Arial" panose="020B0604020202020204" pitchFamily="34" charset="0"/>
-            </a:endParaRPr>
           </a:p>
         </p:txBody>
       </p:sp>
@@ -5804,6 +5631,7 @@
         </p:style>
         <p:txBody>
           <a:bodyPr rtlCol="0" anchor="ctr"/>
+          <a:lstStyle/>
           <a:p>
             <a:pPr algn="ctr"/>
             <a:r>
@@ -5816,13 +5644,6 @@
               </a:rPr>
               <a:t>Ledger 1</a:t>
             </a:r>
-            <a:endParaRPr lang="en-US" sz="1400" b="1">
-              <a:solidFill>
-                <a:schemeClr val="tx1"/>
-              </a:solidFill>
-              <a:latin typeface="Arial" panose="020B0604020202020204" pitchFamily="34" charset="0"/>
-              <a:cs typeface="Arial" panose="020B0604020202020204" pitchFamily="34" charset="0"/>
-            </a:endParaRPr>
           </a:p>
         </p:txBody>
       </p:sp>
@@ -5857,6 +5678,7 @@
         </p:style>
         <p:txBody>
           <a:bodyPr rtlCol="0" anchor="ctr"/>
+          <a:lstStyle/>
           <a:p>
             <a:pPr algn="ctr"/>
             <a:r>
@@ -5869,13 +5691,6 @@
               </a:rPr>
               <a:t>Hospital 1</a:t>
             </a:r>
-            <a:endParaRPr lang="en-US" sz="1400" b="1">
-              <a:solidFill>
-                <a:schemeClr val="tx1"/>
-              </a:solidFill>
-              <a:latin typeface="Arial" panose="020B0604020202020204" pitchFamily="34" charset="0"/>
-              <a:cs typeface="Arial" panose="020B0604020202020204" pitchFamily="34" charset="0"/>
-            </a:endParaRPr>
           </a:p>
         </p:txBody>
       </p:sp>
@@ -5899,6 +5714,7 @@
           <a:bodyPr wrap="none" rtlCol="0">
             <a:spAutoFit/>
           </a:bodyPr>
+          <a:lstStyle/>
           <a:p>
             <a:r>
               <a:rPr lang="en-US" sz="1400" b="1">
@@ -5907,10 +5723,6 @@
               </a:rPr>
               <a:t>New User</a:t>
             </a:r>
-            <a:endParaRPr lang="en-US" sz="1400" b="1">
-              <a:latin typeface="Arial" panose="020B0604020202020204" pitchFamily="34" charset="0"/>
-              <a:cs typeface="Arial" panose="020B0604020202020204" pitchFamily="34" charset="0"/>
-            </a:endParaRPr>
           </a:p>
         </p:txBody>
       </p:sp>
@@ -6134,6 +5946,7 @@
           <a:bodyPr wrap="none" rtlCol="0">
             <a:spAutoFit/>
           </a:bodyPr>
+          <a:lstStyle/>
           <a:p>
             <a:r>
               <a:rPr lang="en-US" sz="1400" b="1">
@@ -6142,10 +5955,6 @@
               </a:rPr>
               <a:t>1.Connect to peer</a:t>
             </a:r>
-            <a:endParaRPr lang="en-US" sz="1400" b="1">
-              <a:latin typeface="Arial" panose="020B0604020202020204" pitchFamily="34" charset="0"/>
-              <a:cs typeface="Arial" panose="020B0604020202020204" pitchFamily="34" charset="0"/>
-            </a:endParaRPr>
           </a:p>
         </p:txBody>
       </p:sp>
@@ -6169,6 +5978,7 @@
           <a:bodyPr wrap="none" rtlCol="0">
             <a:spAutoFit/>
           </a:bodyPr>
+          <a:lstStyle/>
           <a:p>
             <a:r>
               <a:rPr lang="en-US" sz="1400" b="1">
@@ -6177,10 +5987,6 @@
               </a:rPr>
               <a:t>2.Invoke cc(proposal)</a:t>
             </a:r>
-            <a:endParaRPr lang="en-US" sz="1400" b="1">
-              <a:latin typeface="Arial" panose="020B0604020202020204" pitchFamily="34" charset="0"/>
-              <a:cs typeface="Arial" panose="020B0604020202020204" pitchFamily="34" charset="0"/>
-            </a:endParaRPr>
           </a:p>
         </p:txBody>
       </p:sp>
@@ -6204,6 +6010,7 @@
           <a:bodyPr wrap="none" rtlCol="0">
             <a:spAutoFit/>
           </a:bodyPr>
+          <a:lstStyle/>
           <a:p>
             <a:r>
               <a:rPr lang="en-US" sz="1400" b="1">
@@ -6212,10 +6019,6 @@
               </a:rPr>
               <a:t>3.Proposal Response</a:t>
             </a:r>
-            <a:endParaRPr lang="en-US" sz="1400" b="1">
-              <a:latin typeface="Arial" panose="020B0604020202020204" pitchFamily="34" charset="0"/>
-              <a:cs typeface="Arial" panose="020B0604020202020204" pitchFamily="34" charset="0"/>
-            </a:endParaRPr>
           </a:p>
         </p:txBody>
       </p:sp>
@@ -6332,6 +6135,7 @@
           <a:bodyPr wrap="none" rtlCol="0">
             <a:spAutoFit/>
           </a:bodyPr>
+          <a:lstStyle/>
           <a:p>
             <a:r>
               <a:rPr lang="en-US" sz="1400" b="1">
@@ -6340,10 +6144,6 @@
               </a:rPr>
               <a:t>5.Ledger Update Event</a:t>
             </a:r>
-            <a:endParaRPr lang="en-US" sz="1400" b="1">
-              <a:latin typeface="Arial" panose="020B0604020202020204" pitchFamily="34" charset="0"/>
-              <a:cs typeface="Arial" panose="020B0604020202020204" pitchFamily="34" charset="0"/>
-            </a:endParaRPr>
           </a:p>
         </p:txBody>
       </p:sp>
@@ -6430,6 +6230,7 @@
           <a:bodyPr wrap="none" rtlCol="0">
             <a:spAutoFit/>
           </a:bodyPr>
+          <a:lstStyle/>
           <a:p>
             <a:r>
               <a:rPr lang="en-US" sz="1400" b="1">
@@ -6438,10 +6239,6 @@
               </a:rPr>
               <a:t>4.Request that </a:t>
             </a:r>
-            <a:endParaRPr lang="en-US" sz="1400" b="1">
-              <a:latin typeface="Arial" panose="020B0604020202020204" pitchFamily="34" charset="0"/>
-              <a:cs typeface="Arial" panose="020B0604020202020204" pitchFamily="34" charset="0"/>
-            </a:endParaRPr>
           </a:p>
           <a:p>
             <a:r>
@@ -6451,10 +6248,6 @@
               </a:rPr>
               <a:t>transaction is </a:t>
             </a:r>
-            <a:endParaRPr lang="en-US" sz="1400" b="1">
-              <a:latin typeface="Arial" panose="020B0604020202020204" pitchFamily="34" charset="0"/>
-              <a:cs typeface="Arial" panose="020B0604020202020204" pitchFamily="34" charset="0"/>
-            </a:endParaRPr>
           </a:p>
           <a:p>
             <a:r>
@@ -6464,10 +6257,6 @@
               </a:rPr>
               <a:t>ordered</a:t>
             </a:r>
-            <a:endParaRPr lang="en-US" sz="1400" b="1">
-              <a:latin typeface="Arial" panose="020B0604020202020204" pitchFamily="34" charset="0"/>
-              <a:cs typeface="Arial" panose="020B0604020202020204" pitchFamily="34" charset="0"/>
-            </a:endParaRPr>
           </a:p>
         </p:txBody>
       </p:sp>
@@ -6584,6 +6373,7 @@
           <a:bodyPr wrap="none" rtlCol="0">
             <a:spAutoFit/>
           </a:bodyPr>
+          <a:lstStyle/>
           <a:p>
             <a:r>
               <a:rPr lang="en-US" sz="1400" b="1">
@@ -6592,10 +6382,6 @@
               </a:rPr>
               <a:t>2.1.Peer invokes </a:t>
             </a:r>
-            <a:endParaRPr lang="en-US" sz="1400" b="1">
-              <a:latin typeface="Arial" panose="020B0604020202020204" pitchFamily="34" charset="0"/>
-              <a:cs typeface="Arial" panose="020B0604020202020204" pitchFamily="34" charset="0"/>
-            </a:endParaRPr>
           </a:p>
           <a:p>
             <a:r>
@@ -6605,10 +6391,6 @@
               </a:rPr>
               <a:t>chaincode with proposal</a:t>
             </a:r>
-            <a:endParaRPr lang="en-US" sz="1400" b="1">
-              <a:latin typeface="Arial" panose="020B0604020202020204" pitchFamily="34" charset="0"/>
-              <a:cs typeface="Arial" panose="020B0604020202020204" pitchFamily="34" charset="0"/>
-            </a:endParaRPr>
           </a:p>
         </p:txBody>
       </p:sp>
@@ -6727,6 +6509,7 @@
           <a:bodyPr wrap="none" rtlCol="0">
             <a:spAutoFit/>
           </a:bodyPr>
+          <a:lstStyle/>
           <a:p>
             <a:r>
               <a:rPr lang="en-US" sz="1400" b="1">
@@ -6735,10 +6518,6 @@
               </a:rPr>
               <a:t>2.2.CC generates query</a:t>
             </a:r>
-            <a:endParaRPr lang="en-US" sz="1400" b="1">
-              <a:latin typeface="Arial" panose="020B0604020202020204" pitchFamily="34" charset="0"/>
-              <a:cs typeface="Arial" panose="020B0604020202020204" pitchFamily="34" charset="0"/>
-            </a:endParaRPr>
           </a:p>
           <a:p>
             <a:r>
@@ -6748,10 +6527,6 @@
               </a:rPr>
               <a:t>or update </a:t>
             </a:r>
-            <a:endParaRPr lang="en-US" sz="1400" b="1">
-              <a:latin typeface="Arial" panose="020B0604020202020204" pitchFamily="34" charset="0"/>
-              <a:cs typeface="Arial" panose="020B0604020202020204" pitchFamily="34" charset="0"/>
-            </a:endParaRPr>
           </a:p>
           <a:p>
             <a:r>
@@ -6761,10 +6536,6 @@
               </a:rPr>
               <a:t>proposalresponse</a:t>
             </a:r>
-            <a:endParaRPr lang="en-US" sz="1400" b="1">
-              <a:latin typeface="Arial" panose="020B0604020202020204" pitchFamily="34" charset="0"/>
-              <a:cs typeface="Arial" panose="020B0604020202020204" pitchFamily="34" charset="0"/>
-            </a:endParaRPr>
           </a:p>
         </p:txBody>
       </p:sp>
@@ -6853,6 +6624,7 @@
           <a:bodyPr wrap="none" rtlCol="0">
             <a:spAutoFit/>
           </a:bodyPr>
+          <a:lstStyle/>
           <a:p>
             <a:r>
               <a:rPr lang="en-US" sz="1400" b="1">
@@ -6864,13 +6636,6 @@
               </a:rPr>
               <a:t>4.1.Transactions</a:t>
             </a:r>
-            <a:endParaRPr lang="en-US" sz="1400" b="1">
-              <a:solidFill>
-                <a:schemeClr val="tx1"/>
-              </a:solidFill>
-              <a:latin typeface="Arial" panose="020B0604020202020204" pitchFamily="34" charset="0"/>
-              <a:cs typeface="Arial" panose="020B0604020202020204" pitchFamily="34" charset="0"/>
-            </a:endParaRPr>
           </a:p>
           <a:p>
             <a:r>
@@ -6883,13 +6648,6 @@
               </a:rPr>
               <a:t>sent to peers in blocks</a:t>
             </a:r>
-            <a:endParaRPr lang="en-US" sz="1400" b="1">
-              <a:solidFill>
-                <a:schemeClr val="tx1"/>
-              </a:solidFill>
-              <a:latin typeface="Arial" panose="020B0604020202020204" pitchFamily="34" charset="0"/>
-              <a:cs typeface="Arial" panose="020B0604020202020204" pitchFamily="34" charset="0"/>
-            </a:endParaRPr>
           </a:p>
         </p:txBody>
       </p:sp>
@@ -7006,6 +6764,7 @@
           <a:bodyPr wrap="none" rtlCol="0">
             <a:spAutoFit/>
           </a:bodyPr>
+          <a:lstStyle/>
           <a:p>
             <a:r>
               <a:rPr lang="en-US" sz="1400" b="1">
@@ -7014,10 +6773,6 @@
               </a:rPr>
               <a:t>4.2.Peer updates </a:t>
             </a:r>
-            <a:endParaRPr lang="en-US" sz="1400" b="1">
-              <a:latin typeface="Arial" panose="020B0604020202020204" pitchFamily="34" charset="0"/>
-              <a:cs typeface="Arial" panose="020B0604020202020204" pitchFamily="34" charset="0"/>
-            </a:endParaRPr>
           </a:p>
           <a:p>
             <a:r>
@@ -7027,10 +6782,6 @@
               </a:rPr>
               <a:t>ledger using transaction blocks</a:t>
             </a:r>
-            <a:endParaRPr lang="en-US" sz="1400" b="1">
-              <a:latin typeface="Arial" panose="020B0604020202020204" pitchFamily="34" charset="0"/>
-              <a:cs typeface="Arial" panose="020B0604020202020204" pitchFamily="34" charset="0"/>
-            </a:endParaRPr>
           </a:p>
         </p:txBody>
       </p:sp>
@@ -7082,6 +6833,7 @@
         </p:style>
         <p:txBody>
           <a:bodyPr rtlCol="0" anchor="ctr"/>
+          <a:lstStyle/>
           <a:p>
             <a:pPr algn="ctr"/>
             <a:endParaRPr lang="en-US"/>
@@ -7108,6 +6860,7 @@
           <a:bodyPr wrap="none" rtlCol="0">
             <a:spAutoFit/>
           </a:bodyPr>
+          <a:lstStyle/>
           <a:p>
             <a:r>
               <a:rPr lang="en-US" b="1">
@@ -7116,10 +6869,6 @@
               </a:rPr>
               <a:t>BlockChain Network</a:t>
             </a:r>
-            <a:endParaRPr lang="en-US" b="1">
-              <a:latin typeface="Arial" panose="020B0604020202020204" pitchFamily="34" charset="0"/>
-              <a:cs typeface="Arial" panose="020B0604020202020204" pitchFamily="34" charset="0"/>
-            </a:endParaRPr>
           </a:p>
         </p:txBody>
       </p:sp>
@@ -7140,7 +6889,14 @@
         <p:cNvGrpSpPr/>
         <p:nvPr/>
       </p:nvGrpSpPr>
-      <p:grpSpPr/>
+      <p:grpSpPr>
+        <a:xfrm>
+          <a:off x="0" y="0"/>
+          <a:ext cx="0" cy="0"/>
+          <a:chOff x="0" y="0"/>
+          <a:chExt cx="0" cy="0"/>
+        </a:xfrm>
+      </p:grpSpPr>
       <p:sp>
         <p:nvSpPr>
           <p:cNvPr id="2" name="Rectangles 1"/>
@@ -7172,6 +6928,7 @@
         </p:style>
         <p:txBody>
           <a:bodyPr rtlCol="0" anchor="ctr"/>
+          <a:lstStyle/>
           <a:p>
             <a:pPr algn="ctr"/>
             <a:r>
@@ -7184,13 +6941,6 @@
               </a:rPr>
               <a:t>APP</a:t>
             </a:r>
-            <a:endParaRPr lang="en-US" sz="1400" b="1">
-              <a:solidFill>
-                <a:schemeClr val="tx1"/>
-              </a:solidFill>
-              <a:latin typeface="Arial" panose="020B0604020202020204" pitchFamily="34" charset="0"/>
-              <a:cs typeface="Arial" panose="020B0604020202020204" pitchFamily="34" charset="0"/>
-            </a:endParaRPr>
           </a:p>
         </p:txBody>
       </p:sp>
@@ -7198,14 +6948,14 @@
         <p:nvPicPr>
           <p:cNvPr id="8" name="Content Placeholder 7"/>
           <p:cNvPicPr>
-            <a:picLocks noChangeAspect="1"/>
+            <a:picLocks noGrp="1" noChangeAspect="1"/>
           </p:cNvPicPr>
           <p:nvPr>
             <p:ph idx="1"/>
           </p:nvPr>
         </p:nvPicPr>
         <p:blipFill>
-          <a:blip r:embed="rId1"/>
+          <a:blip r:embed="rId2"/>
           <a:stretch>
             <a:fillRect/>
           </a:stretch>
@@ -7240,6 +6990,7 @@
           <a:bodyPr wrap="none" rtlCol="0">
             <a:spAutoFit/>
           </a:bodyPr>
+          <a:lstStyle/>
           <a:p>
             <a:r>
               <a:rPr lang="en-US" sz="1400" b="1">
@@ -7248,10 +6999,6 @@
               </a:rPr>
               <a:t>Patient</a:t>
             </a:r>
-            <a:endParaRPr lang="en-US" sz="1400" b="1">
-              <a:latin typeface="Arial" panose="020B0604020202020204" pitchFamily="34" charset="0"/>
-              <a:cs typeface="Arial" panose="020B0604020202020204" pitchFamily="34" charset="0"/>
-            </a:endParaRPr>
           </a:p>
         </p:txBody>
       </p:sp>
@@ -7286,6 +7033,7 @@
         </p:style>
         <p:txBody>
           <a:bodyPr rtlCol="0" anchor="ctr"/>
+          <a:lstStyle/>
           <a:p>
             <a:pPr algn="ctr"/>
             <a:r>
@@ -7298,13 +7046,6 @@
               </a:rPr>
               <a:t>SDK</a:t>
             </a:r>
-            <a:endParaRPr lang="en-US" sz="1400" b="1">
-              <a:solidFill>
-                <a:schemeClr val="tx1"/>
-              </a:solidFill>
-              <a:latin typeface="Arial" panose="020B0604020202020204" pitchFamily="34" charset="0"/>
-              <a:cs typeface="Arial" panose="020B0604020202020204" pitchFamily="34" charset="0"/>
-            </a:endParaRPr>
           </a:p>
         </p:txBody>
       </p:sp>
@@ -7411,6 +7152,7 @@
         </p:style>
         <p:txBody>
           <a:bodyPr rtlCol="0" anchor="ctr"/>
+          <a:lstStyle/>
           <a:p>
             <a:pPr algn="l"/>
             <a:r>
@@ -7423,13 +7165,6 @@
               </a:rPr>
               <a:t>Patient Details</a:t>
             </a:r>
-            <a:endParaRPr lang="en-US" sz="1400" b="1">
-              <a:solidFill>
-                <a:schemeClr val="tx1"/>
-              </a:solidFill>
-              <a:latin typeface="Arial" panose="020B0604020202020204" pitchFamily="34" charset="0"/>
-              <a:cs typeface="Arial" panose="020B0604020202020204" pitchFamily="34" charset="0"/>
-            </a:endParaRPr>
           </a:p>
         </p:txBody>
       </p:sp>
@@ -7453,34 +7188,31 @@
           <a:bodyPr wrap="square" rtlCol="0">
             <a:spAutoFit/>
           </a:bodyPr>
+          <a:lstStyle/>
           <a:p>
             <a:pPr algn="l"/>
             <a:r>
-              <a:rPr lang="en-US" sz="1400" b="1">
+              <a:rPr lang="en-US" sz="1400" b="1" dirty="0">
                 <a:solidFill>
-                  <a:srgbClr val="00B0F0"/>
+                  <a:srgbClr val="0070C0"/>
                 </a:solidFill>
                 <a:latin typeface="Arial" panose="020B0604020202020204" pitchFamily="34" charset="0"/>
                 <a:cs typeface="Arial" panose="020B0604020202020204" pitchFamily="34" charset="0"/>
               </a:rPr>
-              <a:t>CreatePatientRecord</a:t>
-            </a:r>
-            <a:endParaRPr lang="en-US" sz="1400" b="1">
-              <a:latin typeface="Arial" panose="020B0604020202020204" pitchFamily="34" charset="0"/>
-              <a:cs typeface="Arial" panose="020B0604020202020204" pitchFamily="34" charset="0"/>
-            </a:endParaRPr>
+              <a:t>CreatePatient</a:t>
+            </a:r>
           </a:p>
           <a:p>
             <a:pPr algn="l"/>
             <a:r>
-              <a:rPr lang="en-US" sz="1400" b="1">
+              <a:rPr lang="en-US" sz="1400" b="1" dirty="0">
                 <a:latin typeface="Arial" panose="020B0604020202020204" pitchFamily="34" charset="0"/>
                 <a:cs typeface="Arial" panose="020B0604020202020204" pitchFamily="34" charset="0"/>
               </a:rPr>
               <a:t>(</a:t>
             </a:r>
             <a:r>
-              <a:rPr lang="en-US" sz="1400" b="1">
+              <a:rPr lang="en-US" sz="1400" b="1" dirty="0">
                 <a:latin typeface="Arial" panose="020B0604020202020204" pitchFamily="34" charset="0"/>
                 <a:cs typeface="Arial" panose="020B0604020202020204" pitchFamily="34" charset="0"/>
                 <a:sym typeface="+mn-ea"/>
@@ -7488,16 +7220,12 @@
               <a:t>To create New Patient</a:t>
             </a:r>
             <a:r>
-              <a:rPr lang="en-US" sz="1400" b="1">
+              <a:rPr lang="en-US" sz="1400" b="1" dirty="0">
                 <a:latin typeface="Arial" panose="020B0604020202020204" pitchFamily="34" charset="0"/>
                 <a:cs typeface="Arial" panose="020B0604020202020204" pitchFamily="34" charset="0"/>
               </a:rPr>
               <a:t>)</a:t>
             </a:r>
-            <a:endParaRPr lang="en-US" sz="1400" b="1">
-              <a:latin typeface="Arial" panose="020B0604020202020204" pitchFamily="34" charset="0"/>
-              <a:cs typeface="Arial" panose="020B0604020202020204" pitchFamily="34" charset="0"/>
-            </a:endParaRPr>
           </a:p>
         </p:txBody>
       </p:sp>
@@ -7521,6 +7249,7 @@
           <a:bodyPr wrap="none" rtlCol="0">
             <a:spAutoFit/>
           </a:bodyPr>
+          <a:lstStyle/>
           <a:p>
             <a:pPr algn="l"/>
             <a:r>
@@ -7819,8 +7548,74 @@
         </p:nvSpPr>
         <p:spPr>
           <a:xfrm>
-            <a:off x="4000500" y="1442085"/>
-            <a:ext cx="2783205" cy="737235"/>
+            <a:off x="4023360" y="1263015"/>
+            <a:ext cx="2577531" cy="954107"/>
+          </a:xfrm>
+          <a:prstGeom prst="rect">
+            <a:avLst/>
+          </a:prstGeom>
+          <a:noFill/>
+        </p:spPr>
+        <p:txBody>
+          <a:bodyPr wrap="square" rtlCol="0">
+            <a:spAutoFit/>
+          </a:bodyPr>
+          <a:lstStyle/>
+          <a:p>
+            <a:r>
+              <a:rPr lang="en-IN" sz="1400" b="1" dirty="0">
+                <a:solidFill>
+                  <a:srgbClr val="0070C0"/>
+                </a:solidFill>
+                <a:effectLst/>
+                <a:latin typeface="Arial" panose="020B0604020202020204" pitchFamily="34" charset="0"/>
+                <a:cs typeface="Arial" panose="020B0604020202020204" pitchFamily="34" charset="0"/>
+              </a:rPr>
+              <a:t>grantAccessToDoctor</a:t>
+            </a:r>
+          </a:p>
+          <a:p>
+            <a:pPr algn="l"/>
+            <a:r>
+              <a:rPr lang="en-US" sz="1400" b="1" dirty="0">
+                <a:latin typeface="Arial" panose="020B0604020202020204" pitchFamily="34" charset="0"/>
+                <a:cs typeface="Arial" panose="020B0604020202020204" pitchFamily="34" charset="0"/>
+              </a:rPr>
+              <a:t>(To Grant Access </a:t>
+            </a:r>
+          </a:p>
+          <a:p>
+            <a:pPr algn="l"/>
+            <a:r>
+              <a:rPr lang="en-US" sz="1400" b="1" dirty="0">
+                <a:latin typeface="Arial" panose="020B0604020202020204" pitchFamily="34" charset="0"/>
+                <a:cs typeface="Arial" panose="020B0604020202020204" pitchFamily="34" charset="0"/>
+              </a:rPr>
+              <a:t>to Organizations or Doctors </a:t>
+            </a:r>
+          </a:p>
+          <a:p>
+            <a:pPr algn="l"/>
+            <a:r>
+              <a:rPr lang="en-US" sz="1400" b="1" dirty="0">
+                <a:latin typeface="Arial" panose="020B0604020202020204" pitchFamily="34" charset="0"/>
+                <a:cs typeface="Arial" panose="020B0604020202020204" pitchFamily="34" charset="0"/>
+              </a:rPr>
+              <a:t>By Patient who can update)</a:t>
+            </a:r>
+          </a:p>
+        </p:txBody>
+      </p:sp>
+      <p:sp>
+        <p:nvSpPr>
+          <p:cNvPr id="25" name="Text Box 24"/>
+          <p:cNvSpPr txBox="1"/>
+          <p:nvPr/>
+        </p:nvSpPr>
+        <p:spPr>
+          <a:xfrm>
+            <a:off x="3810635" y="2551430"/>
+            <a:ext cx="2880917" cy="954107"/>
           </a:xfrm>
           <a:prstGeom prst="rect">
             <a:avLst/>
@@ -7831,131 +7626,55 @@
           <a:bodyPr wrap="none" rtlCol="0">
             <a:spAutoFit/>
           </a:bodyPr>
-          <a:p>
-            <a:pPr algn="l"/>
-            <a:r>
-              <a:rPr lang="en-US" sz="1400" b="1">
+          <a:lstStyle/>
+          <a:p>
+            <a:r>
+              <a:rPr lang="en-IN" sz="1400" b="1" dirty="0">
                 <a:solidFill>
-                  <a:srgbClr val="00B0F0"/>
+                  <a:srgbClr val="0070C0"/>
                 </a:solidFill>
-                <a:latin typeface="Arial" panose="020B0604020202020204" pitchFamily="34" charset="0"/>
-                <a:cs typeface="Arial" panose="020B0604020202020204" pitchFamily="34" charset="0"/>
-              </a:rPr>
-              <a:t>GrantAccess</a:t>
-            </a:r>
-            <a:r>
-              <a:rPr lang="en-US" sz="1400" b="1">
-                <a:latin typeface="Arial" panose="020B0604020202020204" pitchFamily="34" charset="0"/>
-                <a:cs typeface="Arial" panose="020B0604020202020204" pitchFamily="34" charset="0"/>
-              </a:rPr>
-              <a:t>(To Grant Access </a:t>
-            </a:r>
-            <a:endParaRPr lang="en-US" sz="1400" b="1">
+                <a:effectLst/>
+                <a:latin typeface="Arial" panose="020B0604020202020204" pitchFamily="34" charset="0"/>
+                <a:cs typeface="Arial" panose="020B0604020202020204" pitchFamily="34" charset="0"/>
+              </a:rPr>
+              <a:t>revokeAccessFromDoctor</a:t>
+            </a:r>
+            <a:endParaRPr lang="en-IN" sz="1400" b="1" dirty="0">
+              <a:solidFill>
+                <a:srgbClr val="0070C0"/>
+              </a:solidFill>
               <a:latin typeface="Arial" panose="020B0604020202020204" pitchFamily="34" charset="0"/>
               <a:cs typeface="Arial" panose="020B0604020202020204" pitchFamily="34" charset="0"/>
             </a:endParaRPr>
           </a:p>
           <a:p>
+            <a:r>
+              <a:rPr lang="en-US" sz="1400" b="1" dirty="0">
+                <a:latin typeface="Arial" panose="020B0604020202020204" pitchFamily="34" charset="0"/>
+                <a:cs typeface="Arial" panose="020B0604020202020204" pitchFamily="34" charset="0"/>
+              </a:rPr>
+              <a:t>(To Revoke Access </a:t>
+            </a:r>
+          </a:p>
+          <a:p>
             <a:pPr algn="l"/>
             <a:r>
-              <a:rPr lang="en-US" sz="1400" b="1">
-                <a:latin typeface="Arial" panose="020B0604020202020204" pitchFamily="34" charset="0"/>
-                <a:cs typeface="Arial" panose="020B0604020202020204" pitchFamily="34" charset="0"/>
-              </a:rPr>
-              <a:t>to Organizations or Doctors </a:t>
-            </a:r>
-            <a:endParaRPr lang="en-US" sz="1400" b="1">
-              <a:latin typeface="Arial" panose="020B0604020202020204" pitchFamily="34" charset="0"/>
-              <a:cs typeface="Arial" panose="020B0604020202020204" pitchFamily="34" charset="0"/>
-            </a:endParaRPr>
+              <a:rPr lang="en-US" sz="1400" b="1" dirty="0">
+                <a:latin typeface="Arial" panose="020B0604020202020204" pitchFamily="34" charset="0"/>
+                <a:cs typeface="Arial" panose="020B0604020202020204" pitchFamily="34" charset="0"/>
+              </a:rPr>
+              <a:t>From Organizations or Doctors </a:t>
+            </a:r>
           </a:p>
           <a:p>
             <a:pPr algn="l"/>
             <a:r>
-              <a:rPr lang="en-US" sz="1400" b="1">
-                <a:latin typeface="Arial" panose="020B0604020202020204" pitchFamily="34" charset="0"/>
-                <a:cs typeface="Arial" panose="020B0604020202020204" pitchFamily="34" charset="0"/>
-              </a:rPr>
-              <a:t>By Patient who can update)</a:t>
-            </a:r>
-            <a:endParaRPr lang="en-US" sz="1400" b="1">
-              <a:latin typeface="Arial" panose="020B0604020202020204" pitchFamily="34" charset="0"/>
-              <a:cs typeface="Arial" panose="020B0604020202020204" pitchFamily="34" charset="0"/>
-            </a:endParaRPr>
-          </a:p>
-        </p:txBody>
-      </p:sp>
-      <p:sp>
-        <p:nvSpPr>
-          <p:cNvPr id="25" name="Text Box 24"/>
-          <p:cNvSpPr txBox="1"/>
-          <p:nvPr/>
-        </p:nvSpPr>
-        <p:spPr>
-          <a:xfrm>
-            <a:off x="3810635" y="2551430"/>
-            <a:ext cx="3051175" cy="737235"/>
-          </a:xfrm>
-          <a:prstGeom prst="rect">
-            <a:avLst/>
-          </a:prstGeom>
-          <a:noFill/>
-        </p:spPr>
-        <p:txBody>
-          <a:bodyPr wrap="none" rtlCol="0">
-            <a:spAutoFit/>
-          </a:bodyPr>
-          <a:p>
-            <a:pPr algn="l"/>
-            <a:r>
-              <a:rPr lang="en-US" sz="1400" b="1">
-                <a:solidFill>
-                  <a:srgbClr val="00B0F0"/>
-                </a:solidFill>
-                <a:latin typeface="Arial" panose="020B0604020202020204" pitchFamily="34" charset="0"/>
-                <a:cs typeface="Arial" panose="020B0604020202020204" pitchFamily="34" charset="0"/>
-              </a:rPr>
-              <a:t>RevokeAccess</a:t>
-            </a:r>
-            <a:r>
-              <a:rPr lang="en-US" sz="1400" b="1">
-                <a:latin typeface="Arial" panose="020B0604020202020204" pitchFamily="34" charset="0"/>
-                <a:cs typeface="Arial" panose="020B0604020202020204" pitchFamily="34" charset="0"/>
-              </a:rPr>
-              <a:t>(ToRevoke Access </a:t>
-            </a:r>
-            <a:endParaRPr lang="en-US" sz="1400" b="1">
-              <a:latin typeface="Arial" panose="020B0604020202020204" pitchFamily="34" charset="0"/>
-              <a:cs typeface="Arial" panose="020B0604020202020204" pitchFamily="34" charset="0"/>
-            </a:endParaRPr>
-          </a:p>
-          <a:p>
-            <a:pPr algn="l"/>
-            <a:r>
-              <a:rPr lang="en-US" sz="1400" b="1">
-                <a:latin typeface="Arial" panose="020B0604020202020204" pitchFamily="34" charset="0"/>
-                <a:cs typeface="Arial" panose="020B0604020202020204" pitchFamily="34" charset="0"/>
-              </a:rPr>
-              <a:t>From Organizations or Doctors </a:t>
-            </a:r>
-            <a:endParaRPr lang="en-US" sz="1400" b="1">
-              <a:latin typeface="Arial" panose="020B0604020202020204" pitchFamily="34" charset="0"/>
-              <a:cs typeface="Arial" panose="020B0604020202020204" pitchFamily="34" charset="0"/>
-            </a:endParaRPr>
-          </a:p>
-          <a:p>
-            <a:pPr algn="l"/>
-            <a:r>
-              <a:rPr lang="en-US" sz="1400" b="1">
+              <a:rPr lang="en-US" sz="1400" b="1" dirty="0">
                 <a:latin typeface="Arial" panose="020B0604020202020204" pitchFamily="34" charset="0"/>
                 <a:cs typeface="Arial" panose="020B0604020202020204" pitchFamily="34" charset="0"/>
               </a:rPr>
               <a:t>By Patient who can’t update)</a:t>
             </a:r>
-            <a:endParaRPr lang="en-US" sz="1400" b="1">
-              <a:latin typeface="Arial" panose="020B0604020202020204" pitchFamily="34" charset="0"/>
-              <a:cs typeface="Arial" panose="020B0604020202020204" pitchFamily="34" charset="0"/>
-            </a:endParaRPr>
           </a:p>
         </p:txBody>
       </p:sp>
@@ -7967,8 +7686,8 @@
         </p:nvSpPr>
         <p:spPr>
           <a:xfrm>
-            <a:off x="8232775" y="1401445"/>
-            <a:ext cx="3017520" cy="3665220"/>
+            <a:off x="8232775" y="712561"/>
+            <a:ext cx="3017520" cy="4354104"/>
           </a:xfrm>
           <a:prstGeom prst="rect">
             <a:avLst/>
@@ -7990,65 +7709,88 @@
         </p:style>
         <p:txBody>
           <a:bodyPr rtlCol="0" anchor="ctr"/>
+          <a:lstStyle/>
           <a:p>
             <a:pPr algn="l"/>
             <a:r>
-              <a:rPr lang="en-US" b="1">
+              <a:rPr lang="en-US" b="1" dirty="0">
                 <a:solidFill>
                   <a:schemeClr val="bg1"/>
                 </a:solidFill>
               </a:rPr>
               <a:t>SAMPLE PATIENT DETAILS</a:t>
             </a:r>
-            <a:endParaRPr lang="en-US" b="1"/>
+            <a:endParaRPr lang="en-US" b="1" dirty="0"/>
           </a:p>
           <a:p>
             <a:pPr algn="l"/>
             <a:r>
-              <a:rPr lang="en-US"/>
-              <a:t>PatientId: "Patient1",</a:t>
-            </a:r>
-            <a:endParaRPr lang="en-US"/>
+              <a:rPr lang="en-US" dirty="0" err="1"/>
+              <a:t>PatientId</a:t>
+            </a:r>
+            <a:r>
+              <a:rPr lang="en-US" dirty="0"/>
+              <a:t>: "Patient1",</a:t>
+            </a:r>
           </a:p>
           <a:p>
             <a:pPr algn="l"/>
             <a:r>
-              <a:rPr lang="en-US"/>
+              <a:rPr lang="en-US" dirty="0"/>
               <a:t>Address: "A1",</a:t>
             </a:r>
-            <a:endParaRPr lang="en-US"/>
           </a:p>
           <a:p>
             <a:pPr algn="l"/>
             <a:r>
-              <a:rPr lang="en-US"/>
-              <a:t>Telephone: 741258,        BloodGroup: "A1",        HealthRecordId: "EHR1",        Diagnosis: "D1",</a:t>
-            </a:r>
-            <a:endParaRPr lang="en-US"/>
+              <a:rPr lang="en-US" dirty="0"/>
+              <a:t>Telephone: 741258,        </a:t>
+            </a:r>
+            <a:r>
+              <a:rPr lang="en-US" dirty="0" err="1"/>
+              <a:t>BloodGroup</a:t>
+            </a:r>
+            <a:r>
+              <a:rPr lang="en-US" dirty="0"/>
+              <a:t>: "A1",        </a:t>
+            </a:r>
+            <a:r>
+              <a:rPr lang="en-US" dirty="0" err="1"/>
+              <a:t>HealthRecordId</a:t>
+            </a:r>
+            <a:r>
+              <a:rPr lang="en-US" dirty="0"/>
+              <a:t>: "EHR1",        Diagnosis: "D1",</a:t>
+            </a:r>
           </a:p>
           <a:p>
             <a:pPr algn="l"/>
             <a:r>
-              <a:rPr lang="en-US"/>
+              <a:rPr lang="en-US" dirty="0"/>
               <a:t>Medication: "M1",</a:t>
             </a:r>
-            <a:endParaRPr lang="en-US"/>
           </a:p>
           <a:p>
             <a:pPr algn="l"/>
             <a:r>
-              <a:rPr lang="en-US"/>
-              <a:t>DoctorAuthorizationList: ["Doc1"],</a:t>
-            </a:r>
-            <a:endParaRPr lang="en-US"/>
+              <a:rPr lang="en-US" dirty="0" err="1"/>
+              <a:t>DoctorAuthorizationList</a:t>
+            </a:r>
+            <a:r>
+              <a:rPr lang="en-US" dirty="0"/>
+              <a:t>: ["Doc1"],</a:t>
+            </a:r>
           </a:p>
           <a:p>
             <a:pPr algn="l"/>
             <a:r>
-              <a:rPr lang="en-US"/>
-              <a:t>OrganisationAuthorizationList: ["Hospital1"]</a:t>
-            </a:r>
-            <a:endParaRPr lang="en-US"/>
+              <a:rPr lang="en-US" dirty="0" err="1"/>
+              <a:t>OrganisationAuthorizationList</a:t>
+            </a:r>
+            <a:r>
+              <a:rPr lang="en-US" dirty="0"/>
+              <a:t>: ["Hospital1"]</a:t>
+            </a:r>
           </a:p>
         </p:txBody>
       </p:sp>
@@ -8083,6 +7825,7 @@
         </p:style>
         <p:txBody>
           <a:bodyPr rtlCol="0" anchor="ctr"/>
+          <a:lstStyle/>
           <a:p>
             <a:pPr algn="ctr"/>
             <a:r>
@@ -8096,7 +7839,67 @@
               </a:rPr>
               <a:t>OrganisationAuthorizationList</a:t>
             </a:r>
-            <a:endParaRPr lang="en-US" sz="1400" b="1">
+          </a:p>
+          <a:p>
+            <a:pPr algn="ctr"/>
+            <a:r>
+              <a:rPr lang="en-US" sz="1400" b="1">
+                <a:latin typeface="Arial" panose="020B0604020202020204" pitchFamily="34" charset="0"/>
+                <a:cs typeface="Arial" panose="020B0604020202020204" pitchFamily="34" charset="0"/>
+                <a:sym typeface="+mn-ea"/>
+              </a:rPr>
+              <a:t>Authorized organizations Who can view the details</a:t>
+            </a:r>
+            <a:endParaRPr lang="en-US" sz="1400"/>
+          </a:p>
+        </p:txBody>
+      </p:sp>
+      <p:sp>
+        <p:nvSpPr>
+          <p:cNvPr id="28" name="Rectangles 27"/>
+          <p:cNvSpPr/>
+          <p:nvPr/>
+        </p:nvSpPr>
+        <p:spPr>
+          <a:xfrm>
+            <a:off x="4693920" y="5256530"/>
+            <a:ext cx="3075305" cy="822960"/>
+          </a:xfrm>
+          <a:prstGeom prst="rect">
+            <a:avLst/>
+          </a:prstGeom>
+        </p:spPr>
+        <p:style>
+          <a:lnRef idx="1">
+            <a:schemeClr val="accent6"/>
+          </a:lnRef>
+          <a:fillRef idx="2">
+            <a:schemeClr val="accent6"/>
+          </a:fillRef>
+          <a:effectRef idx="1">
+            <a:schemeClr val="accent6"/>
+          </a:effectRef>
+          <a:fontRef idx="minor">
+            <a:schemeClr val="dk1"/>
+          </a:fontRef>
+        </p:style>
+        <p:txBody>
+          <a:bodyPr rtlCol="0" anchor="ctr"/>
+          <a:lstStyle/>
+          <a:p>
+            <a:pPr algn="ctr"/>
+            <a:r>
+              <a:rPr lang="en-US" sz="1400" b="1" dirty="0" err="1">
+                <a:solidFill>
+                  <a:schemeClr val="bg1"/>
+                </a:solidFill>
+                <a:latin typeface="Arial" panose="020B0604020202020204" pitchFamily="34" charset="0"/>
+                <a:cs typeface="Arial" panose="020B0604020202020204" pitchFamily="34" charset="0"/>
+                <a:sym typeface="+mn-ea"/>
+              </a:rPr>
+              <a:t>DoctorAuthorizationList</a:t>
+            </a:r>
+            <a:endParaRPr lang="en-US" sz="1400" b="1" dirty="0">
               <a:solidFill>
                 <a:schemeClr val="bg1"/>
               </a:solidFill>
@@ -8108,81 +7911,30 @@
           <a:p>
             <a:pPr algn="ctr"/>
             <a:r>
-              <a:rPr lang="en-US" sz="1400" b="1">
+              <a:rPr lang="en-US" sz="1400" b="1" dirty="0">
                 <a:latin typeface="Arial" panose="020B0604020202020204" pitchFamily="34" charset="0"/>
                 <a:cs typeface="Arial" panose="020B0604020202020204" pitchFamily="34" charset="0"/>
                 <a:sym typeface="+mn-ea"/>
               </a:rPr>
-              <a:t>Authorized organizations Who can view the details</a:t>
-            </a:r>
-            <a:endParaRPr lang="en-US" sz="1400"/>
-          </a:p>
-        </p:txBody>
-      </p:sp>
-      <p:sp>
-        <p:nvSpPr>
-          <p:cNvPr id="28" name="Rectangles 27"/>
-          <p:cNvSpPr/>
-          <p:nvPr/>
-        </p:nvSpPr>
-        <p:spPr>
-          <a:xfrm>
-            <a:off x="4693920" y="5256530"/>
-            <a:ext cx="3075305" cy="822960"/>
-          </a:xfrm>
-          <a:prstGeom prst="rect">
-            <a:avLst/>
-          </a:prstGeom>
-        </p:spPr>
-        <p:style>
-          <a:lnRef idx="1">
-            <a:schemeClr val="accent6"/>
-          </a:lnRef>
-          <a:fillRef idx="2">
-            <a:schemeClr val="accent6"/>
-          </a:fillRef>
-          <a:effectRef idx="1">
-            <a:schemeClr val="accent6"/>
-          </a:effectRef>
-          <a:fontRef idx="minor">
-            <a:schemeClr val="dk1"/>
-          </a:fontRef>
-        </p:style>
-        <p:txBody>
-          <a:bodyPr rtlCol="0" anchor="ctr"/>
-          <a:p>
-            <a:pPr algn="ctr"/>
-            <a:r>
-              <a:rPr lang="en-US" sz="1400" b="1">
-                <a:solidFill>
-                  <a:schemeClr val="bg1"/>
-                </a:solidFill>
+              <a:t>Authorized </a:t>
+            </a:r>
+            <a:r>
+              <a:rPr lang="en-US" sz="1400" b="1" dirty="0" err="1">
                 <a:latin typeface="Arial" panose="020B0604020202020204" pitchFamily="34" charset="0"/>
                 <a:cs typeface="Arial" panose="020B0604020202020204" pitchFamily="34" charset="0"/>
                 <a:sym typeface="+mn-ea"/>
               </a:rPr>
-              <a:t>DoctorAuthorizationList</a:t>
-            </a:r>
-            <a:endParaRPr lang="en-US" sz="1400" b="1">
-              <a:solidFill>
-                <a:schemeClr val="bg1"/>
-              </a:solidFill>
-              <a:latin typeface="Arial" panose="020B0604020202020204" pitchFamily="34" charset="0"/>
-              <a:cs typeface="Arial" panose="020B0604020202020204" pitchFamily="34" charset="0"/>
-              <a:sym typeface="+mn-ea"/>
-            </a:endParaRPr>
-          </a:p>
-          <a:p>
-            <a:pPr algn="ctr"/>
-            <a:r>
-              <a:rPr lang="en-US" sz="1400" b="1">
+              <a:t>doctorsWho</a:t>
+            </a:r>
+            <a:r>
+              <a:rPr lang="en-US" sz="1400" b="1" dirty="0">
                 <a:latin typeface="Arial" panose="020B0604020202020204" pitchFamily="34" charset="0"/>
                 <a:cs typeface="Arial" panose="020B0604020202020204" pitchFamily="34" charset="0"/>
                 <a:sym typeface="+mn-ea"/>
               </a:rPr>
-              <a:t>Authorized doctorsWho can view and update the patient details</a:t>
-            </a:r>
-            <a:endParaRPr lang="en-US" sz="1400"/>
+              <a:t> can view and update the patient details</a:t>
+            </a:r>
+            <a:endParaRPr lang="en-US" sz="1400" dirty="0"/>
           </a:p>
         </p:txBody>
       </p:sp>
@@ -8203,7 +7955,14 @@
         <p:cNvGrpSpPr/>
         <p:nvPr/>
       </p:nvGrpSpPr>
-      <p:grpSpPr/>
+      <p:grpSpPr>
+        <a:xfrm>
+          <a:off x="0" y="0"/>
+          <a:ext cx="0" cy="0"/>
+          <a:chOff x="0" y="0"/>
+          <a:chExt cx="0" cy="0"/>
+        </a:xfrm>
+      </p:grpSpPr>
       <p:sp>
         <p:nvSpPr>
           <p:cNvPr id="2" name="Rectangles 1"/>
@@ -8235,6 +7994,7 @@
         </p:style>
         <p:txBody>
           <a:bodyPr rtlCol="0" anchor="ctr"/>
+          <a:lstStyle/>
           <a:p>
             <a:pPr algn="ctr"/>
             <a:r>
@@ -8247,13 +8007,6 @@
               </a:rPr>
               <a:t>APP</a:t>
             </a:r>
-            <a:endParaRPr lang="en-US" sz="1400" b="1">
-              <a:solidFill>
-                <a:schemeClr val="tx1"/>
-              </a:solidFill>
-              <a:latin typeface="Arial" panose="020B0604020202020204" pitchFamily="34" charset="0"/>
-              <a:cs typeface="Arial" panose="020B0604020202020204" pitchFamily="34" charset="0"/>
-            </a:endParaRPr>
           </a:p>
         </p:txBody>
       </p:sp>
@@ -8261,14 +8014,14 @@
         <p:nvPicPr>
           <p:cNvPr id="8" name="Content Placeholder 7"/>
           <p:cNvPicPr>
-            <a:picLocks noChangeAspect="1"/>
+            <a:picLocks noGrp="1" noChangeAspect="1"/>
           </p:cNvPicPr>
           <p:nvPr>
             <p:ph idx="1"/>
           </p:nvPr>
         </p:nvPicPr>
         <p:blipFill>
-          <a:blip r:embed="rId1"/>
+          <a:blip r:embed="rId2"/>
           <a:stretch>
             <a:fillRect/>
           </a:stretch>
@@ -8303,6 +8056,7 @@
           <a:bodyPr wrap="none" rtlCol="0">
             <a:spAutoFit/>
           </a:bodyPr>
+          <a:lstStyle/>
           <a:p>
             <a:r>
               <a:rPr lang="en-US" sz="1400" b="1">
@@ -8311,10 +8065,6 @@
               </a:rPr>
               <a:t>Doctors</a:t>
             </a:r>
-            <a:endParaRPr lang="en-US" sz="1400" b="1">
-              <a:latin typeface="Arial" panose="020B0604020202020204" pitchFamily="34" charset="0"/>
-              <a:cs typeface="Arial" panose="020B0604020202020204" pitchFamily="34" charset="0"/>
-            </a:endParaRPr>
           </a:p>
         </p:txBody>
       </p:sp>
@@ -8349,6 +8099,7 @@
         </p:style>
         <p:txBody>
           <a:bodyPr rtlCol="0" anchor="ctr"/>
+          <a:lstStyle/>
           <a:p>
             <a:pPr algn="ctr"/>
             <a:r>
@@ -8361,13 +8112,6 @@
               </a:rPr>
               <a:t>SDK</a:t>
             </a:r>
-            <a:endParaRPr lang="en-US" sz="1400" b="1">
-              <a:solidFill>
-                <a:schemeClr val="tx1"/>
-              </a:solidFill>
-              <a:latin typeface="Arial" panose="020B0604020202020204" pitchFamily="34" charset="0"/>
-              <a:cs typeface="Arial" panose="020B0604020202020204" pitchFamily="34" charset="0"/>
-            </a:endParaRPr>
           </a:p>
         </p:txBody>
       </p:sp>
@@ -8474,6 +8218,7 @@
         </p:style>
         <p:txBody>
           <a:bodyPr rtlCol="0" anchor="ctr"/>
+          <a:lstStyle/>
           <a:p>
             <a:pPr algn="l"/>
             <a:r>
@@ -8486,13 +8231,6 @@
               </a:rPr>
               <a:t>Patient Details</a:t>
             </a:r>
-            <a:endParaRPr lang="en-US" sz="1400" b="1">
-              <a:solidFill>
-                <a:schemeClr val="tx1"/>
-              </a:solidFill>
-              <a:latin typeface="Arial" panose="020B0604020202020204" pitchFamily="34" charset="0"/>
-              <a:cs typeface="Arial" panose="020B0604020202020204" pitchFamily="34" charset="0"/>
-            </a:endParaRPr>
           </a:p>
         </p:txBody>
       </p:sp>
@@ -8805,6 +8543,7 @@
           <a:bodyPr wrap="none" rtlCol="0">
             <a:spAutoFit/>
           </a:bodyPr>
+          <a:lstStyle/>
           <a:p>
             <a:pPr algn="l"/>
             <a:r>
@@ -8824,10 +8563,6 @@
               </a:rPr>
               <a:t>(To Read Patient Record </a:t>
             </a:r>
-            <a:endParaRPr lang="en-US" sz="1400" b="1">
-              <a:latin typeface="Arial" panose="020B0604020202020204" pitchFamily="34" charset="0"/>
-              <a:cs typeface="Arial" panose="020B0604020202020204" pitchFamily="34" charset="0"/>
-            </a:endParaRPr>
           </a:p>
           <a:p>
             <a:pPr algn="l"/>
@@ -8838,10 +8573,6 @@
               </a:rPr>
               <a:t>By Doctor ( Only Authorized Doctors Can able to Read))</a:t>
             </a:r>
-            <a:endParaRPr lang="en-US" sz="1400" b="1">
-              <a:latin typeface="Arial" panose="020B0604020202020204" pitchFamily="34" charset="0"/>
-              <a:cs typeface="Arial" panose="020B0604020202020204" pitchFamily="34" charset="0"/>
-            </a:endParaRPr>
           </a:p>
         </p:txBody>
       </p:sp>
@@ -8865,6 +8596,7 @@
           <a:bodyPr wrap="none" rtlCol="0">
             <a:spAutoFit/>
           </a:bodyPr>
+          <a:lstStyle/>
           <a:p>
             <a:pPr algn="l"/>
             <a:r>
@@ -8884,10 +8616,6 @@
               </a:rPr>
               <a:t>(To Update</a:t>
             </a:r>
-            <a:endParaRPr lang="en-US" sz="1400" b="1">
-              <a:latin typeface="Arial" panose="020B0604020202020204" pitchFamily="34" charset="0"/>
-              <a:cs typeface="Arial" panose="020B0604020202020204" pitchFamily="34" charset="0"/>
-            </a:endParaRPr>
           </a:p>
           <a:p>
             <a:pPr algn="l"/>
@@ -8898,10 +8626,6 @@
               </a:rPr>
               <a:t>Patient Record By Doctor ( Only Authorized </a:t>
             </a:r>
-            <a:endParaRPr lang="en-US" sz="1400" b="1">
-              <a:latin typeface="Arial" panose="020B0604020202020204" pitchFamily="34" charset="0"/>
-              <a:cs typeface="Arial" panose="020B0604020202020204" pitchFamily="34" charset="0"/>
-            </a:endParaRPr>
           </a:p>
           <a:p>
             <a:pPr algn="l"/>
@@ -8912,10 +8636,6 @@
               </a:rPr>
               <a:t>Doctors Can able to Update))</a:t>
             </a:r>
-            <a:endParaRPr lang="en-US" sz="1400" b="1">
-              <a:latin typeface="Arial" panose="020B0604020202020204" pitchFamily="34" charset="0"/>
-              <a:cs typeface="Arial" panose="020B0604020202020204" pitchFamily="34" charset="0"/>
-            </a:endParaRPr>
           </a:p>
         </p:txBody>
       </p:sp>
@@ -8939,6 +8659,7 @@
           <a:bodyPr wrap="none" rtlCol="0">
             <a:spAutoFit/>
           </a:bodyPr>
+          <a:lstStyle/>
           <a:p>
             <a:pPr algn="l"/>
             <a:r>
@@ -8958,10 +8679,6 @@
               </a:rPr>
               <a:t>(To Delete</a:t>
             </a:r>
-            <a:endParaRPr lang="en-US" sz="1400" b="1">
-              <a:latin typeface="Arial" panose="020B0604020202020204" pitchFamily="34" charset="0"/>
-              <a:cs typeface="Arial" panose="020B0604020202020204" pitchFamily="34" charset="0"/>
-            </a:endParaRPr>
           </a:p>
           <a:p>
             <a:pPr algn="l"/>
@@ -8972,10 +8689,6 @@
               </a:rPr>
               <a:t>Patient Record By Doctor ( Only Authorized </a:t>
             </a:r>
-            <a:endParaRPr lang="en-US" sz="1400" b="1">
-              <a:latin typeface="Arial" panose="020B0604020202020204" pitchFamily="34" charset="0"/>
-              <a:cs typeface="Arial" panose="020B0604020202020204" pitchFamily="34" charset="0"/>
-            </a:endParaRPr>
           </a:p>
           <a:p>
             <a:pPr algn="l"/>
@@ -9001,10 +8714,6 @@
               </a:rPr>
               <a:t>))</a:t>
             </a:r>
-            <a:endParaRPr lang="en-US" sz="1400" b="1">
-              <a:latin typeface="Arial" panose="020B0604020202020204" pitchFamily="34" charset="0"/>
-              <a:cs typeface="Arial" panose="020B0604020202020204" pitchFamily="34" charset="0"/>
-            </a:endParaRPr>
           </a:p>
         </p:txBody>
       </p:sp>
@@ -9028,6 +8737,7 @@
           <a:bodyPr wrap="none" rtlCol="0">
             <a:spAutoFit/>
           </a:bodyPr>
+          <a:lstStyle/>
           <a:p>
             <a:pPr algn="l"/>
             <a:r>
@@ -9047,10 +8757,6 @@
               </a:rPr>
               <a:t>(ToGet the History </a:t>
             </a:r>
-            <a:endParaRPr lang="en-US" sz="1400" b="1">
-              <a:latin typeface="Arial" panose="020B0604020202020204" pitchFamily="34" charset="0"/>
-              <a:cs typeface="Arial" panose="020B0604020202020204" pitchFamily="34" charset="0"/>
-            </a:endParaRPr>
           </a:p>
           <a:p>
             <a:pPr algn="l"/>
@@ -9061,10 +8767,6 @@
               </a:rPr>
               <a:t>Of the Record Updates for particular Patient</a:t>
             </a:r>
-            <a:endParaRPr lang="en-US" sz="1400" b="1">
-              <a:latin typeface="Arial" panose="020B0604020202020204" pitchFamily="34" charset="0"/>
-              <a:cs typeface="Arial" panose="020B0604020202020204" pitchFamily="34" charset="0"/>
-            </a:endParaRPr>
           </a:p>
           <a:p>
             <a:pPr algn="l"/>
@@ -9075,10 +8777,6 @@
               </a:rPr>
               <a:t>(( From Register to Current State )))</a:t>
             </a:r>
-            <a:endParaRPr lang="en-US" sz="1400" b="1">
-              <a:latin typeface="Arial" panose="020B0604020202020204" pitchFamily="34" charset="0"/>
-              <a:cs typeface="Arial" panose="020B0604020202020204" pitchFamily="34" charset="0"/>
-            </a:endParaRPr>
           </a:p>
         </p:txBody>
       </p:sp>
@@ -9102,6 +8800,7 @@
           <a:bodyPr wrap="none" rtlCol="0">
             <a:spAutoFit/>
           </a:bodyPr>
+          <a:lstStyle/>
           <a:p>
             <a:pPr algn="l"/>
             <a:r>
@@ -9121,10 +8820,6 @@
               </a:rPr>
               <a:t>(To Read </a:t>
             </a:r>
-            <a:endParaRPr lang="en-US" sz="1400" b="1">
-              <a:latin typeface="Arial" panose="020B0604020202020204" pitchFamily="34" charset="0"/>
-              <a:cs typeface="Arial" panose="020B0604020202020204" pitchFamily="34" charset="0"/>
-            </a:endParaRPr>
           </a:p>
           <a:p>
             <a:pPr algn="l"/>
@@ -9135,10 +8830,6 @@
               </a:rPr>
               <a:t>Specific Patient Record By PatientId)</a:t>
             </a:r>
-            <a:endParaRPr lang="en-US" sz="1400" b="1">
-              <a:latin typeface="Arial" panose="020B0604020202020204" pitchFamily="34" charset="0"/>
-              <a:cs typeface="Arial" panose="020B0604020202020204" pitchFamily="34" charset="0"/>
-            </a:endParaRPr>
           </a:p>
         </p:txBody>
       </p:sp>
@@ -9173,6 +8864,7 @@
         </p:style>
         <p:txBody>
           <a:bodyPr rtlCol="0" anchor="ctr"/>
+          <a:lstStyle/>
           <a:p>
             <a:pPr algn="ctr"/>
             <a:r>
@@ -9185,13 +8877,6 @@
               </a:rPr>
               <a:t>APP</a:t>
             </a:r>
-            <a:endParaRPr lang="en-US" sz="1400" b="1">
-              <a:solidFill>
-                <a:schemeClr val="tx1"/>
-              </a:solidFill>
-              <a:latin typeface="Arial" panose="020B0604020202020204" pitchFamily="34" charset="0"/>
-              <a:cs typeface="Arial" panose="020B0604020202020204" pitchFamily="34" charset="0"/>
-            </a:endParaRPr>
           </a:p>
         </p:txBody>
       </p:sp>
@@ -9204,7 +8889,7 @@
           <p:nvPr/>
         </p:nvPicPr>
         <p:blipFill>
-          <a:blip r:embed="rId1"/>
+          <a:blip r:embed="rId2"/>
           <a:stretch>
             <a:fillRect/>
           </a:stretch>
@@ -9239,6 +8924,7 @@
           <a:bodyPr wrap="none" rtlCol="0">
             <a:spAutoFit/>
           </a:bodyPr>
+          <a:lstStyle/>
           <a:p>
             <a:r>
               <a:rPr lang="en-US" sz="1400" b="1">
@@ -9247,10 +8933,6 @@
               </a:rPr>
               <a:t>Admin</a:t>
             </a:r>
-            <a:endParaRPr lang="en-US" sz="1400" b="1">
-              <a:latin typeface="Arial" panose="020B0604020202020204" pitchFamily="34" charset="0"/>
-              <a:cs typeface="Arial" panose="020B0604020202020204" pitchFamily="34" charset="0"/>
-            </a:endParaRPr>
           </a:p>
         </p:txBody>
       </p:sp>
@@ -9285,6 +8967,7 @@
         </p:style>
         <p:txBody>
           <a:bodyPr rtlCol="0" anchor="ctr"/>
+          <a:lstStyle/>
           <a:p>
             <a:pPr algn="ctr"/>
             <a:r>
@@ -9297,13 +8980,6 @@
               </a:rPr>
               <a:t>SDK</a:t>
             </a:r>
-            <a:endParaRPr lang="en-US" sz="1400" b="1">
-              <a:solidFill>
-                <a:schemeClr val="tx1"/>
-              </a:solidFill>
-              <a:latin typeface="Arial" panose="020B0604020202020204" pitchFamily="34" charset="0"/>
-              <a:cs typeface="Arial" panose="020B0604020202020204" pitchFamily="34" charset="0"/>
-            </a:endParaRPr>
           </a:p>
         </p:txBody>
       </p:sp>
@@ -9410,6 +9086,7 @@
         </p:style>
         <p:txBody>
           <a:bodyPr rtlCol="0" anchor="ctr"/>
+          <a:lstStyle/>
           <a:p>
             <a:pPr algn="l"/>
             <a:r>
@@ -9422,13 +9099,6 @@
               </a:rPr>
               <a:t>Patient Details</a:t>
             </a:r>
-            <a:endParaRPr lang="en-US" sz="1400" b="1">
-              <a:solidFill>
-                <a:schemeClr val="tx1"/>
-              </a:solidFill>
-              <a:latin typeface="Arial" panose="020B0604020202020204" pitchFamily="34" charset="0"/>
-              <a:cs typeface="Arial" panose="020B0604020202020204" pitchFamily="34" charset="0"/>
-            </a:endParaRPr>
           </a:p>
         </p:txBody>
       </p:sp>
@@ -9487,6 +9157,7 @@
           <a:bodyPr wrap="none" rtlCol="0">
             <a:spAutoFit/>
           </a:bodyPr>
+          <a:lstStyle/>
           <a:p>
             <a:pPr algn="l"/>
             <a:r>
@@ -9506,10 +9177,6 @@
               </a:rPr>
               <a:t>(To Get All the Patient </a:t>
             </a:r>
-            <a:endParaRPr lang="en-US" sz="1400" b="1">
-              <a:latin typeface="Arial" panose="020B0604020202020204" pitchFamily="34" charset="0"/>
-              <a:cs typeface="Arial" panose="020B0604020202020204" pitchFamily="34" charset="0"/>
-            </a:endParaRPr>
           </a:p>
           <a:p>
             <a:pPr algn="l"/>
@@ -9520,10 +9187,6 @@
               </a:rPr>
               <a:t>Records in the System </a:t>
             </a:r>
-            <a:endParaRPr lang="en-US" sz="1400" b="1">
-              <a:latin typeface="Arial" panose="020B0604020202020204" pitchFamily="34" charset="0"/>
-              <a:cs typeface="Arial" panose="020B0604020202020204" pitchFamily="34" charset="0"/>
-            </a:endParaRPr>
           </a:p>
           <a:p>
             <a:pPr algn="l"/>
@@ -9534,10 +9197,6 @@
               </a:rPr>
               <a:t>( Only Hospital Admins Can Call It ))</a:t>
             </a:r>
-            <a:endParaRPr lang="en-US" sz="1400" b="1">
-              <a:latin typeface="Arial" panose="020B0604020202020204" pitchFamily="34" charset="0"/>
-              <a:cs typeface="Arial" panose="020B0604020202020204" pitchFamily="34" charset="0"/>
-            </a:endParaRPr>
           </a:p>
         </p:txBody>
       </p:sp>
@@ -9800,6 +9459,8 @@
       </a:bgFillStyleLst>
     </a:fmtScheme>
   </a:themeElements>
+  <a:objectDefaults/>
+  <a:extraClrSchemeLst/>
   <a:extLst>
     <a:ext uri="{05A4C25C-085E-4340-85A3-A5531E510DB2}">
       <thm15:themeFamily xmlns:thm15="http://schemas.microsoft.com/office/thememl/2012/main" name="Office Theme" id="{62F939B6-93AF-4DB8-9C6B-D6C7DFDC589F}" vid="{4A3C46E8-61CC-4603-A589-7422A47A8E4A}"/>

</xml_diff>